<commit_message>
Module 05 Release Candidate
</commit_message>
<xml_diff>
--- a/Slides/Module 05 Concurrency Patterns in Typescript.pptx
+++ b/Slides/Module 05 Concurrency Patterns in Typescript.pptx
@@ -5,7 +5,7 @@
     <p:sldMasterId id="2147483703" r:id="rId1"/>
   </p:sldMasterIdLst>
   <p:notesMasterIdLst>
-    <p:notesMasterId r:id="rId37"/>
+    <p:notesMasterId r:id="rId36"/>
   </p:notesMasterIdLst>
   <p:sldIdLst>
     <p:sldId id="485" r:id="rId2"/>
@@ -42,7 +42,6 @@
     <p:sldId id="557" r:id="rId33"/>
     <p:sldId id="543" r:id="rId34"/>
     <p:sldId id="555" r:id="rId35"/>
-    <p:sldId id="552" r:id="rId36"/>
   </p:sldIdLst>
   <p:sldSz cx="12192000" cy="6858000"/>
   <p:notesSz cx="6858000" cy="9144000"/>
@@ -448,6 +447,60 @@
           <pc:docMk/>
           <pc:sldMk cId="2314319587" sldId="556"/>
         </pc:sldMkLst>
+      </pc:sldChg>
+    </pc:docChg>
+  </pc:docChgLst>
+  <pc:docChgLst>
+    <pc:chgData name="Mitchell Wand" userId="de9b44c55c049659" providerId="LiveId" clId="{5F788236-F622-4F92-81A2-AAB773A767CB}"/>
+    <pc:docChg chg="undo custSel addSld modSld">
+      <pc:chgData name="Mitchell Wand" userId="de9b44c55c049659" providerId="LiveId" clId="{5F788236-F622-4F92-81A2-AAB773A767CB}" dt="2022-09-20T18:38:28.835" v="671" actId="20577"/>
+      <pc:docMkLst>
+        <pc:docMk/>
+      </pc:docMkLst>
+      <pc:sldChg chg="modNotesTx">
+        <pc:chgData name="Mitchell Wand" userId="de9b44c55c049659" providerId="LiveId" clId="{5F788236-F622-4F92-81A2-AAB773A767CB}" dt="2022-09-20T17:28:28.152" v="82" actId="20577"/>
+        <pc:sldMkLst>
+          <pc:docMk/>
+          <pc:sldMk cId="0" sldId="262"/>
+        </pc:sldMkLst>
+      </pc:sldChg>
+      <pc:sldChg chg="modNotesTx">
+        <pc:chgData name="Mitchell Wand" userId="de9b44c55c049659" providerId="LiveId" clId="{5F788236-F622-4F92-81A2-AAB773A767CB}" dt="2022-09-20T17:29:13.896" v="184" actId="20577"/>
+        <pc:sldMkLst>
+          <pc:docMk/>
+          <pc:sldMk cId="966027799" sldId="514"/>
+        </pc:sldMkLst>
+      </pc:sldChg>
+      <pc:sldChg chg="addSp modSp new mod modNotesTx">
+        <pc:chgData name="Mitchell Wand" userId="de9b44c55c049659" providerId="LiveId" clId="{5F788236-F622-4F92-81A2-AAB773A767CB}" dt="2022-09-20T18:38:28.835" v="671" actId="20577"/>
+        <pc:sldMkLst>
+          <pc:docMk/>
+          <pc:sldMk cId="3573365039" sldId="557"/>
+        </pc:sldMkLst>
+        <pc:spChg chg="mod">
+          <ac:chgData name="Mitchell Wand" userId="de9b44c55c049659" providerId="LiveId" clId="{5F788236-F622-4F92-81A2-AAB773A767CB}" dt="2022-09-20T18:38:28.835" v="671" actId="20577"/>
+          <ac:spMkLst>
+            <pc:docMk/>
+            <pc:sldMk cId="3573365039" sldId="557"/>
+            <ac:spMk id="2" creationId="{4AB7B9C2-5D09-C319-491E-9E97079CFA3D}"/>
+          </ac:spMkLst>
+        </pc:spChg>
+        <pc:spChg chg="mod">
+          <ac:chgData name="Mitchell Wand" userId="de9b44c55c049659" providerId="LiveId" clId="{5F788236-F622-4F92-81A2-AAB773A767CB}" dt="2022-09-20T18:34:42.701" v="281"/>
+          <ac:spMkLst>
+            <pc:docMk/>
+            <pc:sldMk cId="3573365039" sldId="557"/>
+            <ac:spMk id="3" creationId="{E95A29C5-3A07-008B-EE77-48C8F818925D}"/>
+          </ac:spMkLst>
+        </pc:spChg>
+        <pc:spChg chg="add mod">
+          <ac:chgData name="Mitchell Wand" userId="de9b44c55c049659" providerId="LiveId" clId="{5F788236-F622-4F92-81A2-AAB773A767CB}" dt="2022-09-20T18:36:09.157" v="308" actId="6549"/>
+          <ac:spMkLst>
+            <pc:docMk/>
+            <pc:sldMk cId="3573365039" sldId="557"/>
+            <ac:spMk id="6" creationId="{D7EEA937-36F0-3A62-61A1-D81A0C7A205D}"/>
+          </ac:spMkLst>
+        </pc:spChg>
       </pc:sldChg>
     </pc:docChg>
   </pc:docChgLst>
@@ -1001,60 +1054,6 @@
           <pc:docMk/>
           <pc:sldMk cId="1831664636" sldId="580"/>
         </pc:sldMkLst>
-      </pc:sldChg>
-    </pc:docChg>
-  </pc:docChgLst>
-  <pc:docChgLst>
-    <pc:chgData name="Mitchell Wand" userId="de9b44c55c049659" providerId="LiveId" clId="{5F788236-F622-4F92-81A2-AAB773A767CB}"/>
-    <pc:docChg chg="undo custSel addSld modSld">
-      <pc:chgData name="Mitchell Wand" userId="de9b44c55c049659" providerId="LiveId" clId="{5F788236-F622-4F92-81A2-AAB773A767CB}" dt="2022-09-20T18:38:28.835" v="671" actId="20577"/>
-      <pc:docMkLst>
-        <pc:docMk/>
-      </pc:docMkLst>
-      <pc:sldChg chg="modNotesTx">
-        <pc:chgData name="Mitchell Wand" userId="de9b44c55c049659" providerId="LiveId" clId="{5F788236-F622-4F92-81A2-AAB773A767CB}" dt="2022-09-20T17:28:28.152" v="82" actId="20577"/>
-        <pc:sldMkLst>
-          <pc:docMk/>
-          <pc:sldMk cId="0" sldId="262"/>
-        </pc:sldMkLst>
-      </pc:sldChg>
-      <pc:sldChg chg="modNotesTx">
-        <pc:chgData name="Mitchell Wand" userId="de9b44c55c049659" providerId="LiveId" clId="{5F788236-F622-4F92-81A2-AAB773A767CB}" dt="2022-09-20T17:29:13.896" v="184" actId="20577"/>
-        <pc:sldMkLst>
-          <pc:docMk/>
-          <pc:sldMk cId="966027799" sldId="514"/>
-        </pc:sldMkLst>
-      </pc:sldChg>
-      <pc:sldChg chg="addSp modSp new mod modNotesTx">
-        <pc:chgData name="Mitchell Wand" userId="de9b44c55c049659" providerId="LiveId" clId="{5F788236-F622-4F92-81A2-AAB773A767CB}" dt="2022-09-20T18:38:28.835" v="671" actId="20577"/>
-        <pc:sldMkLst>
-          <pc:docMk/>
-          <pc:sldMk cId="3573365039" sldId="557"/>
-        </pc:sldMkLst>
-        <pc:spChg chg="mod">
-          <ac:chgData name="Mitchell Wand" userId="de9b44c55c049659" providerId="LiveId" clId="{5F788236-F622-4F92-81A2-AAB773A767CB}" dt="2022-09-20T18:38:28.835" v="671" actId="20577"/>
-          <ac:spMkLst>
-            <pc:docMk/>
-            <pc:sldMk cId="3573365039" sldId="557"/>
-            <ac:spMk id="2" creationId="{4AB7B9C2-5D09-C319-491E-9E97079CFA3D}"/>
-          </ac:spMkLst>
-        </pc:spChg>
-        <pc:spChg chg="mod">
-          <ac:chgData name="Mitchell Wand" userId="de9b44c55c049659" providerId="LiveId" clId="{5F788236-F622-4F92-81A2-AAB773A767CB}" dt="2022-09-20T18:34:42.701" v="281"/>
-          <ac:spMkLst>
-            <pc:docMk/>
-            <pc:sldMk cId="3573365039" sldId="557"/>
-            <ac:spMk id="3" creationId="{E95A29C5-3A07-008B-EE77-48C8F818925D}"/>
-          </ac:spMkLst>
-        </pc:spChg>
-        <pc:spChg chg="add mod">
-          <ac:chgData name="Mitchell Wand" userId="de9b44c55c049659" providerId="LiveId" clId="{5F788236-F622-4F92-81A2-AAB773A767CB}" dt="2022-09-20T18:36:09.157" v="308" actId="6549"/>
-          <ac:spMkLst>
-            <pc:docMk/>
-            <pc:sldMk cId="3573365039" sldId="557"/>
-            <ac:spMk id="6" creationId="{D7EEA937-36F0-3A62-61A1-D81A0C7A205D}"/>
-          </ac:spMkLst>
-        </pc:spChg>
       </pc:sldChg>
     </pc:docChg>
   </pc:docChgLst>
@@ -4150,93 +4149,6 @@
 </p:notes>
 </file>
 
-<file path=ppt/notesSlides/notesSlide23.xml><?xml version="1.0" encoding="utf-8"?>
-<p:notes xmlns:a="http://schemas.openxmlformats.org/drawingml/2006/main" xmlns:r="http://schemas.openxmlformats.org/officeDocument/2006/relationships" xmlns:p="http://schemas.openxmlformats.org/presentationml/2006/main">
-  <p:cSld>
-    <p:spTree>
-      <p:nvGrpSpPr>
-        <p:cNvPr id="1" name=""/>
-        <p:cNvGrpSpPr/>
-        <p:nvPr/>
-      </p:nvGrpSpPr>
-      <p:grpSpPr>
-        <a:xfrm>
-          <a:off x="0" y="0"/>
-          <a:ext cx="0" cy="0"/>
-          <a:chOff x="0" y="0"/>
-          <a:chExt cx="0" cy="0"/>
-        </a:xfrm>
-      </p:grpSpPr>
-      <p:sp>
-        <p:nvSpPr>
-          <p:cNvPr id="2" name="Slide Image Placeholder 1"/>
-          <p:cNvSpPr>
-            <a:spLocks noGrp="1" noRot="1" noChangeAspect="1"/>
-          </p:cNvSpPr>
-          <p:nvPr>
-            <p:ph type="sldImg"/>
-          </p:nvPr>
-        </p:nvSpPr>
-        <p:spPr/>
-      </p:sp>
-      <p:sp>
-        <p:nvSpPr>
-          <p:cNvPr id="3" name="Notes Placeholder 2"/>
-          <p:cNvSpPr>
-            <a:spLocks noGrp="1"/>
-          </p:cNvSpPr>
-          <p:nvPr>
-            <p:ph type="body" idx="1"/>
-          </p:nvPr>
-        </p:nvSpPr>
-        <p:spPr/>
-        <p:txBody>
-          <a:bodyPr/>
-          <a:lstStyle/>
-          <a:p>
-            <a:r>
-              <a:rPr lang="en-US" dirty="0"/>
-              <a:t>&lt;read slide&gt;</a:t>
-            </a:r>
-          </a:p>
-        </p:txBody>
-      </p:sp>
-      <p:sp>
-        <p:nvSpPr>
-          <p:cNvPr id="4" name="Slide Number Placeholder 3"/>
-          <p:cNvSpPr>
-            <a:spLocks noGrp="1"/>
-          </p:cNvSpPr>
-          <p:nvPr>
-            <p:ph type="sldNum" sz="quarter" idx="5"/>
-          </p:nvPr>
-        </p:nvSpPr>
-        <p:spPr/>
-        <p:txBody>
-          <a:bodyPr/>
-          <a:lstStyle/>
-          <a:p>
-            <a:fld id="{07937F07-1250-4CCE-B198-1B2887014F41}" type="slidenum">
-              <a:rPr lang="en-US" smtClean="0"/>
-              <a:t>35</a:t>
-            </a:fld>
-            <a:endParaRPr lang="en-US"/>
-          </a:p>
-        </p:txBody>
-      </p:sp>
-    </p:spTree>
-    <p:extLst>
-      <p:ext uri="{BB962C8B-B14F-4D97-AF65-F5344CB8AC3E}">
-        <p14:creationId xmlns:p14="http://schemas.microsoft.com/office/powerpoint/2010/main" val="2031181207"/>
-      </p:ext>
-    </p:extLst>
-  </p:cSld>
-  <p:clrMapOvr>
-    <a:masterClrMapping/>
-  </p:clrMapOvr>
-</p:notes>
-</file>
-
 <file path=ppt/notesSlides/notesSlide3.xml><?xml version="1.0" encoding="utf-8"?>
 <p:notes xmlns:a="http://schemas.openxmlformats.org/drawingml/2006/main" xmlns:r="http://schemas.openxmlformats.org/officeDocument/2006/relationships" xmlns:p="http://schemas.openxmlformats.org/presentationml/2006/main">
   <p:cSld>
@@ -4968,7 +4880,7 @@
                 <a:tabLst/>
                 <a:defRPr/>
               </a:pPr>
-              <a:t>12/20/2022</a:t>
+              <a:t>1/17/2023</a:t>
             </a:fld>
             <a:endParaRPr kumimoji="0" lang="en-US" sz="1200" b="0" i="0" u="none" strike="noStrike" kern="1200" cap="none" spc="0" normalizeH="0" baseline="0" noProof="0">
               <a:ln>
@@ -5452,7 +5364,7 @@
                 <a:tabLst/>
                 <a:defRPr/>
               </a:pPr>
-              <a:t>12/20/2022</a:t>
+              <a:t>1/17/2023</a:t>
             </a:fld>
             <a:endParaRPr kumimoji="0" lang="en-US" sz="1200" b="0" i="0" u="none" strike="noStrike" kern="1200" cap="none" spc="0" normalizeH="0" baseline="0" noProof="0">
               <a:ln>
@@ -5810,7 +5722,7 @@
                 <a:tabLst/>
                 <a:defRPr/>
               </a:pPr>
-              <a:t>12/20/2022</a:t>
+              <a:t>1/17/2023</a:t>
             </a:fld>
             <a:endParaRPr kumimoji="0" lang="en-US" sz="1200" b="0" i="0" u="none" strike="noStrike" kern="1200" cap="none" spc="0" normalizeH="0" baseline="0" noProof="0">
               <a:ln>
@@ -6178,7 +6090,7 @@
                 <a:tabLst/>
                 <a:defRPr/>
               </a:pPr>
-              <a:t>12/20/2022</a:t>
+              <a:t>1/17/2023</a:t>
             </a:fld>
             <a:endParaRPr kumimoji="0" lang="en-US" sz="1200" b="0" i="0" u="none" strike="noStrike" kern="1200" cap="none" spc="0" normalizeH="0" baseline="0" noProof="0">
               <a:ln>
@@ -7144,7 +7056,7 @@
                 <a:tabLst/>
                 <a:defRPr/>
               </a:pPr>
-              <a:t>12/20/2022</a:t>
+              <a:t>1/17/2023</a:t>
             </a:fld>
             <a:endParaRPr kumimoji="0" lang="en-US" sz="1200" b="0" i="0" u="none" strike="noStrike" kern="1200" cap="none" spc="0" normalizeH="0" baseline="0" noProof="0">
               <a:ln>
@@ -7554,7 +7466,7 @@
                 <a:tabLst/>
                 <a:defRPr/>
               </a:pPr>
-              <a:t>12/20/2022</a:t>
+              <a:t>1/17/2023</a:t>
             </a:fld>
             <a:endParaRPr kumimoji="0" lang="en-US" sz="1200" b="0" i="0" u="none" strike="noStrike" kern="1200" cap="none" spc="0" normalizeH="0" baseline="0" noProof="0">
               <a:ln>
@@ -7896,7 +7808,7 @@
                 <a:tabLst/>
                 <a:defRPr/>
               </a:pPr>
-              <a:t>12/20/2022</a:t>
+              <a:t>1/17/2023</a:t>
             </a:fld>
             <a:endParaRPr kumimoji="0" lang="en-US" sz="1200" b="0" i="0" u="none" strike="noStrike" kern="1200" cap="none" spc="0" normalizeH="0" baseline="0" noProof="0">
               <a:ln>
@@ -8369,7 +8281,7 @@
                 <a:tabLst/>
                 <a:defRPr/>
               </a:pPr>
-              <a:t>12/20/2022</a:t>
+              <a:t>1/17/2023</a:t>
             </a:fld>
             <a:endParaRPr kumimoji="0" lang="en-US" sz="1200" b="0" i="0" u="none" strike="noStrike" kern="1200" cap="none" spc="0" normalizeH="0" baseline="0" noProof="0">
               <a:ln>
@@ -8830,7 +8742,7 @@
                 <a:tabLst/>
                 <a:defRPr/>
               </a:pPr>
-              <a:t>12/20/2022</a:t>
+              <a:t>1/17/2023</a:t>
             </a:fld>
             <a:endParaRPr kumimoji="0" lang="en-US" sz="1200" b="0" i="0" u="none" strike="noStrike" kern="1200" cap="none" spc="0" normalizeH="0" baseline="0" noProof="0">
               <a:ln>
@@ -9438,7 +9350,7 @@
                 <a:tabLst/>
                 <a:defRPr/>
               </a:pPr>
-              <a:t>12/20/2022</a:t>
+              <a:t>1/17/2023</a:t>
             </a:fld>
             <a:endParaRPr kumimoji="0" lang="en-US" sz="1200" b="0" i="0" u="none" strike="noStrike" kern="1200" cap="none" spc="0" normalizeH="0" baseline="0" noProof="0">
               <a:ln>
@@ -9711,7 +9623,7 @@
                 <a:tabLst/>
                 <a:defRPr/>
               </a:pPr>
-              <a:t>12/20/2022</a:t>
+              <a:t>1/17/2023</a:t>
             </a:fld>
             <a:endParaRPr kumimoji="0" lang="en-US" sz="1200" b="0" i="0" u="none" strike="noStrike" kern="1200" cap="none" spc="0" normalizeH="0" baseline="0" noProof="0">
               <a:ln>
@@ -10182,7 +10094,7 @@
                 <a:tabLst/>
                 <a:defRPr/>
               </a:pPr>
-              <a:t>12/20/2022</a:t>
+              <a:t>1/17/2023</a:t>
             </a:fld>
             <a:endParaRPr kumimoji="0" lang="en-US" sz="1200" b="0" i="0" u="none" strike="noStrike" kern="1200" cap="none" spc="0" normalizeH="0" baseline="0" noProof="0">
               <a:ln>
@@ -10583,7 +10495,7 @@
                 <a:tabLst/>
                 <a:defRPr/>
               </a:pPr>
-              <a:t>12/20/2022</a:t>
+              <a:t>1/17/2023</a:t>
             </a:fld>
             <a:endParaRPr kumimoji="0" lang="en-US" sz="1200" b="0" i="0" u="none" strike="noStrike" kern="1200" cap="none" spc="0" normalizeH="0" baseline="0" noProof="0">
               <a:ln>
@@ -11199,11 +11111,19 @@
             </a:pPr>
             <a:r>
               <a:rPr lang="en-US" sz="2400" dirty="0"/>
-              <a:t>Jonathan Bell, Adeel </a:t>
+              <a:t>Adeel </a:t>
             </a:r>
             <a:r>
               <a:rPr lang="en-US" sz="2400" dirty="0" err="1"/>
               <a:t>Bhutta</a:t>
+            </a:r>
+            <a:r>
+              <a:rPr lang="en-US" sz="2400" dirty="0"/>
+              <a:t>, Jan </a:t>
+            </a:r>
+            <a:r>
+              <a:rPr lang="en-US" sz="2400" dirty="0" err="1"/>
+              <a:t>Vitek</a:t>
             </a:r>
             <a:r>
               <a:rPr lang="en-US" sz="2400" dirty="0"/>
@@ -11290,7 +11210,7 @@
                   <a:srgbClr val="5C5962"/>
                 </a:solidFill>
               </a:rPr>
-              <a:t>© 2022 Released under the </a:t>
+              <a:t>© 2023 Released under the </a:t>
             </a:r>
             <a:r>
               <a:rPr lang="en-US" dirty="0">
@@ -19892,7 +19812,7 @@
           </a:ln>
           <a:extLst>
             <a:ext uri="{C572A759-6A51-4108-AA02-DFA0A04FC94B}">
-              <ma14:wrappingTextBoxFlag xmlns:ma14="http://schemas.microsoft.com/office/mac/drawingml/2011/main" xmlns:a14="http://schemas.microsoft.com/office/drawing/2010/main" xmlns:m="http://schemas.openxmlformats.org/officeDocument/2006/math" xmlns="" val="1"/>
+              <ma14:wrappingTextBoxFlag xmlns="" xmlns:m="http://schemas.openxmlformats.org/officeDocument/2006/math" xmlns:a14="http://schemas.microsoft.com/office/drawing/2010/main" xmlns:ma14="http://schemas.microsoft.com/office/mac/drawingml/2011/main" val="1"/>
             </a:ext>
           </a:extLst>
         </p:spPr>
@@ -20481,7 +20401,7 @@
           </a:ln>
           <a:extLst>
             <a:ext uri="{C572A759-6A51-4108-AA02-DFA0A04FC94B}">
-              <ma14:wrappingTextBoxFlag xmlns:ma14="http://schemas.microsoft.com/office/mac/drawingml/2011/main" xmlns:a14="http://schemas.microsoft.com/office/drawing/2010/main" xmlns:m="http://schemas.openxmlformats.org/officeDocument/2006/math" xmlns="" val="1"/>
+              <ma14:wrappingTextBoxFlag xmlns="" xmlns:m="http://schemas.openxmlformats.org/officeDocument/2006/math" xmlns:a14="http://schemas.microsoft.com/office/drawing/2010/main" xmlns:ma14="http://schemas.microsoft.com/office/mac/drawingml/2011/main" val="1"/>
             </a:ext>
           </a:extLst>
         </p:spPr>
@@ -21682,7 +21602,7 @@
             <a:effectLst/>
             <a:extLst>
               <a:ext uri="{C572A759-6A51-4108-AA02-DFA0A04FC94B}">
-                <ma14:wrappingTextBoxFlag xmlns:ma14="http://schemas.microsoft.com/office/mac/drawingml/2011/main" xmlns:a14="http://schemas.microsoft.com/office/drawing/2010/main" xmlns:m="http://schemas.openxmlformats.org/officeDocument/2006/math" xmlns="" val="1"/>
+                <ma14:wrappingTextBoxFlag xmlns="" xmlns:m="http://schemas.openxmlformats.org/officeDocument/2006/math" xmlns:a14="http://schemas.microsoft.com/office/drawing/2010/main" xmlns:ma14="http://schemas.microsoft.com/office/mac/drawingml/2011/main" val="1"/>
               </a:ext>
             </a:extLst>
           </p:spPr>
@@ -21751,7 +21671,7 @@
             <a:effectLst/>
             <a:extLst>
               <a:ext uri="{C572A759-6A51-4108-AA02-DFA0A04FC94B}">
-                <ma14:wrappingTextBoxFlag xmlns:ma14="http://schemas.microsoft.com/office/mac/drawingml/2011/main" xmlns:a14="http://schemas.microsoft.com/office/drawing/2010/main" xmlns:m="http://schemas.openxmlformats.org/officeDocument/2006/math" xmlns="" val="1"/>
+                <ma14:wrappingTextBoxFlag xmlns="" xmlns:m="http://schemas.openxmlformats.org/officeDocument/2006/math" xmlns:a14="http://schemas.microsoft.com/office/drawing/2010/main" xmlns:ma14="http://schemas.microsoft.com/office/mac/drawingml/2011/main" val="1"/>
               </a:ext>
             </a:extLst>
           </p:spPr>
@@ -21817,7 +21737,7 @@
             </a:ln>
             <a:extLst>
               <a:ext uri="{C572A759-6A51-4108-AA02-DFA0A04FC94B}">
-                <ma14:wrappingTextBoxFlag xmlns:ma14="http://schemas.microsoft.com/office/mac/drawingml/2011/main" xmlns:a14="http://schemas.microsoft.com/office/drawing/2010/main" xmlns:m="http://schemas.openxmlformats.org/officeDocument/2006/math" xmlns="" val="1"/>
+                <ma14:wrappingTextBoxFlag xmlns="" xmlns:m="http://schemas.openxmlformats.org/officeDocument/2006/math" xmlns:a14="http://schemas.microsoft.com/office/drawing/2010/main" xmlns:ma14="http://schemas.microsoft.com/office/mac/drawingml/2011/main" val="1"/>
               </a:ext>
             </a:extLst>
           </p:spPr>
@@ -21875,7 +21795,7 @@
             </a:ln>
             <a:extLst>
               <a:ext uri="{C572A759-6A51-4108-AA02-DFA0A04FC94B}">
-                <ma14:wrappingTextBoxFlag xmlns:ma14="http://schemas.microsoft.com/office/mac/drawingml/2011/main" xmlns:a14="http://schemas.microsoft.com/office/drawing/2010/main" xmlns:m="http://schemas.openxmlformats.org/officeDocument/2006/math" xmlns="" val="1"/>
+                <ma14:wrappingTextBoxFlag xmlns="" xmlns:m="http://schemas.openxmlformats.org/officeDocument/2006/math" xmlns:a14="http://schemas.microsoft.com/office/drawing/2010/main" xmlns:ma14="http://schemas.microsoft.com/office/mac/drawingml/2011/main" val="1"/>
               </a:ext>
             </a:extLst>
           </p:spPr>
@@ -21956,7 +21876,7 @@
             <a:effectLst/>
             <a:extLst>
               <a:ext uri="{C572A759-6A51-4108-AA02-DFA0A04FC94B}">
-                <ma14:wrappingTextBoxFlag xmlns:ma14="http://schemas.microsoft.com/office/mac/drawingml/2011/main" xmlns:a14="http://schemas.microsoft.com/office/drawing/2010/main" xmlns:m="http://schemas.openxmlformats.org/officeDocument/2006/math" xmlns="" val="1"/>
+                <ma14:wrappingTextBoxFlag xmlns="" xmlns:m="http://schemas.openxmlformats.org/officeDocument/2006/math" xmlns:a14="http://schemas.microsoft.com/office/drawing/2010/main" xmlns:ma14="http://schemas.microsoft.com/office/mac/drawingml/2011/main" val="1"/>
               </a:ext>
             </a:extLst>
           </p:spPr>
@@ -22029,7 +21949,7 @@
             <a:effectLst/>
             <a:extLst>
               <a:ext uri="{C572A759-6A51-4108-AA02-DFA0A04FC94B}">
-                <ma14:wrappingTextBoxFlag xmlns:ma14="http://schemas.microsoft.com/office/mac/drawingml/2011/main" xmlns:a14="http://schemas.microsoft.com/office/drawing/2010/main" xmlns:m="http://schemas.openxmlformats.org/officeDocument/2006/math" xmlns="" val="1"/>
+                <ma14:wrappingTextBoxFlag xmlns="" xmlns:m="http://schemas.openxmlformats.org/officeDocument/2006/math" xmlns:a14="http://schemas.microsoft.com/office/drawing/2010/main" xmlns:ma14="http://schemas.microsoft.com/office/mac/drawingml/2011/main" val="1"/>
               </a:ext>
             </a:extLst>
           </p:spPr>
@@ -22095,7 +22015,7 @@
             </a:ln>
             <a:extLst>
               <a:ext uri="{C572A759-6A51-4108-AA02-DFA0A04FC94B}">
-                <ma14:wrappingTextBoxFlag xmlns:ma14="http://schemas.microsoft.com/office/mac/drawingml/2011/main" xmlns:a14="http://schemas.microsoft.com/office/drawing/2010/main" xmlns:m="http://schemas.openxmlformats.org/officeDocument/2006/math" xmlns="" val="1"/>
+                <ma14:wrappingTextBoxFlag xmlns="" xmlns:m="http://schemas.openxmlformats.org/officeDocument/2006/math" xmlns:a14="http://schemas.microsoft.com/office/drawing/2010/main" xmlns:ma14="http://schemas.microsoft.com/office/mac/drawingml/2011/main" val="1"/>
               </a:ext>
             </a:extLst>
           </p:spPr>
@@ -22153,7 +22073,7 @@
             </a:ln>
             <a:extLst>
               <a:ext uri="{C572A759-6A51-4108-AA02-DFA0A04FC94B}">
-                <ma14:wrappingTextBoxFlag xmlns:ma14="http://schemas.microsoft.com/office/mac/drawingml/2011/main" xmlns:a14="http://schemas.microsoft.com/office/drawing/2010/main" xmlns:m="http://schemas.openxmlformats.org/officeDocument/2006/math" xmlns="" val="1"/>
+                <ma14:wrappingTextBoxFlag xmlns="" xmlns:m="http://schemas.openxmlformats.org/officeDocument/2006/math" xmlns:a14="http://schemas.microsoft.com/office/drawing/2010/main" xmlns:ma14="http://schemas.microsoft.com/office/mac/drawingml/2011/main" val="1"/>
               </a:ext>
             </a:extLst>
           </p:spPr>
@@ -22234,7 +22154,7 @@
             <a:effectLst/>
             <a:extLst>
               <a:ext uri="{C572A759-6A51-4108-AA02-DFA0A04FC94B}">
-                <ma14:wrappingTextBoxFlag xmlns:ma14="http://schemas.microsoft.com/office/mac/drawingml/2011/main" xmlns:a14="http://schemas.microsoft.com/office/drawing/2010/main" xmlns:m="http://schemas.openxmlformats.org/officeDocument/2006/math" xmlns="" val="1"/>
+                <ma14:wrappingTextBoxFlag xmlns="" xmlns:m="http://schemas.openxmlformats.org/officeDocument/2006/math" xmlns:a14="http://schemas.microsoft.com/office/drawing/2010/main" xmlns:ma14="http://schemas.microsoft.com/office/mac/drawingml/2011/main" val="1"/>
               </a:ext>
             </a:extLst>
           </p:spPr>
@@ -22307,7 +22227,7 @@
             <a:effectLst/>
             <a:extLst>
               <a:ext uri="{C572A759-6A51-4108-AA02-DFA0A04FC94B}">
-                <ma14:wrappingTextBoxFlag xmlns:ma14="http://schemas.microsoft.com/office/mac/drawingml/2011/main" xmlns:a14="http://schemas.microsoft.com/office/drawing/2010/main" xmlns:m="http://schemas.openxmlformats.org/officeDocument/2006/math" xmlns="" val="1"/>
+                <ma14:wrappingTextBoxFlag xmlns="" xmlns:m="http://schemas.openxmlformats.org/officeDocument/2006/math" xmlns:a14="http://schemas.microsoft.com/office/drawing/2010/main" xmlns:ma14="http://schemas.microsoft.com/office/mac/drawingml/2011/main" val="1"/>
               </a:ext>
             </a:extLst>
           </p:spPr>
@@ -22373,7 +22293,7 @@
             </a:ln>
             <a:extLst>
               <a:ext uri="{C572A759-6A51-4108-AA02-DFA0A04FC94B}">
-                <ma14:wrappingTextBoxFlag xmlns:ma14="http://schemas.microsoft.com/office/mac/drawingml/2011/main" xmlns:a14="http://schemas.microsoft.com/office/drawing/2010/main" xmlns:m="http://schemas.openxmlformats.org/officeDocument/2006/math" xmlns="" val="1"/>
+                <ma14:wrappingTextBoxFlag xmlns="" xmlns:m="http://schemas.openxmlformats.org/officeDocument/2006/math" xmlns:a14="http://schemas.microsoft.com/office/drawing/2010/main" xmlns:ma14="http://schemas.microsoft.com/office/mac/drawingml/2011/main" val="1"/>
               </a:ext>
             </a:extLst>
           </p:spPr>
@@ -22431,7 +22351,7 @@
             </a:ln>
             <a:extLst>
               <a:ext uri="{C572A759-6A51-4108-AA02-DFA0A04FC94B}">
-                <ma14:wrappingTextBoxFlag xmlns:ma14="http://schemas.microsoft.com/office/mac/drawingml/2011/main" xmlns:a14="http://schemas.microsoft.com/office/drawing/2010/main" xmlns:m="http://schemas.openxmlformats.org/officeDocument/2006/math" xmlns="" val="1"/>
+                <ma14:wrappingTextBoxFlag xmlns="" xmlns:m="http://schemas.openxmlformats.org/officeDocument/2006/math" xmlns:a14="http://schemas.microsoft.com/office/drawing/2010/main" xmlns:ma14="http://schemas.microsoft.com/office/mac/drawingml/2011/main" val="1"/>
               </a:ext>
             </a:extLst>
           </p:spPr>
@@ -22512,7 +22432,7 @@
             <a:effectLst/>
             <a:extLst>
               <a:ext uri="{C572A759-6A51-4108-AA02-DFA0A04FC94B}">
-                <ma14:wrappingTextBoxFlag xmlns:ma14="http://schemas.microsoft.com/office/mac/drawingml/2011/main" xmlns:a14="http://schemas.microsoft.com/office/drawing/2010/main" xmlns:m="http://schemas.openxmlformats.org/officeDocument/2006/math" xmlns="" val="1"/>
+                <ma14:wrappingTextBoxFlag xmlns="" xmlns:m="http://schemas.openxmlformats.org/officeDocument/2006/math" xmlns:a14="http://schemas.microsoft.com/office/drawing/2010/main" xmlns:ma14="http://schemas.microsoft.com/office/mac/drawingml/2011/main" val="1"/>
               </a:ext>
             </a:extLst>
           </p:spPr>
@@ -22581,7 +22501,7 @@
             <a:effectLst/>
             <a:extLst>
               <a:ext uri="{C572A759-6A51-4108-AA02-DFA0A04FC94B}">
-                <ma14:wrappingTextBoxFlag xmlns:ma14="http://schemas.microsoft.com/office/mac/drawingml/2011/main" xmlns:a14="http://schemas.microsoft.com/office/drawing/2010/main" xmlns:m="http://schemas.openxmlformats.org/officeDocument/2006/math" xmlns="" val="1"/>
+                <ma14:wrappingTextBoxFlag xmlns="" xmlns:m="http://schemas.openxmlformats.org/officeDocument/2006/math" xmlns:a14="http://schemas.microsoft.com/office/drawing/2010/main" xmlns:ma14="http://schemas.microsoft.com/office/mac/drawingml/2011/main" val="1"/>
               </a:ext>
             </a:extLst>
           </p:spPr>
@@ -22647,7 +22567,7 @@
             </a:ln>
             <a:extLst>
               <a:ext uri="{C572A759-6A51-4108-AA02-DFA0A04FC94B}">
-                <ma14:wrappingTextBoxFlag xmlns:ma14="http://schemas.microsoft.com/office/mac/drawingml/2011/main" xmlns:a14="http://schemas.microsoft.com/office/drawing/2010/main" xmlns:m="http://schemas.openxmlformats.org/officeDocument/2006/math" xmlns="" val="1"/>
+                <ma14:wrappingTextBoxFlag xmlns="" xmlns:m="http://schemas.openxmlformats.org/officeDocument/2006/math" xmlns:a14="http://schemas.microsoft.com/office/drawing/2010/main" xmlns:ma14="http://schemas.microsoft.com/office/mac/drawingml/2011/main" val="1"/>
               </a:ext>
             </a:extLst>
           </p:spPr>
@@ -22705,7 +22625,7 @@
             </a:ln>
             <a:extLst>
               <a:ext uri="{C572A759-6A51-4108-AA02-DFA0A04FC94B}">
-                <ma14:wrappingTextBoxFlag xmlns:ma14="http://schemas.microsoft.com/office/mac/drawingml/2011/main" xmlns:a14="http://schemas.microsoft.com/office/drawing/2010/main" xmlns:m="http://schemas.openxmlformats.org/officeDocument/2006/math" xmlns="" val="1"/>
+                <ma14:wrappingTextBoxFlag xmlns="" xmlns:m="http://schemas.openxmlformats.org/officeDocument/2006/math" xmlns:a14="http://schemas.microsoft.com/office/drawing/2010/main" xmlns:ma14="http://schemas.microsoft.com/office/mac/drawingml/2011/main" val="1"/>
               </a:ext>
             </a:extLst>
           </p:spPr>
@@ -22786,7 +22706,7 @@
             <a:effectLst/>
             <a:extLst>
               <a:ext uri="{C572A759-6A51-4108-AA02-DFA0A04FC94B}">
-                <ma14:wrappingTextBoxFlag xmlns:ma14="http://schemas.microsoft.com/office/mac/drawingml/2011/main" xmlns:a14="http://schemas.microsoft.com/office/drawing/2010/main" xmlns:m="http://schemas.openxmlformats.org/officeDocument/2006/math" xmlns="" val="1"/>
+                <ma14:wrappingTextBoxFlag xmlns="" xmlns:m="http://schemas.openxmlformats.org/officeDocument/2006/math" xmlns:a14="http://schemas.microsoft.com/office/drawing/2010/main" xmlns:ma14="http://schemas.microsoft.com/office/mac/drawingml/2011/main" val="1"/>
               </a:ext>
             </a:extLst>
           </p:spPr>
@@ -22879,7 +22799,7 @@
               <a:effectLst/>
               <a:extLst>
                 <a:ext uri="{C572A759-6A51-4108-AA02-DFA0A04FC94B}">
-                  <ma14:wrappingTextBoxFlag xmlns:ma14="http://schemas.microsoft.com/office/mac/drawingml/2011/main" xmlns:a14="http://schemas.microsoft.com/office/drawing/2010/main" xmlns:m="http://schemas.openxmlformats.org/officeDocument/2006/math" xmlns="" val="1"/>
+                  <ma14:wrappingTextBoxFlag xmlns="" xmlns:m="http://schemas.openxmlformats.org/officeDocument/2006/math" xmlns:a14="http://schemas.microsoft.com/office/drawing/2010/main" xmlns:ma14="http://schemas.microsoft.com/office/mac/drawingml/2011/main" val="1"/>
                 </a:ext>
               </a:extLst>
             </p:spPr>
@@ -22945,7 +22865,7 @@
               </a:ln>
               <a:extLst>
                 <a:ext uri="{C572A759-6A51-4108-AA02-DFA0A04FC94B}">
-                  <ma14:wrappingTextBoxFlag xmlns:ma14="http://schemas.microsoft.com/office/mac/drawingml/2011/main" xmlns:a14="http://schemas.microsoft.com/office/drawing/2010/main" xmlns:m="http://schemas.openxmlformats.org/officeDocument/2006/math" xmlns="" val="1"/>
+                  <ma14:wrappingTextBoxFlag xmlns="" xmlns:m="http://schemas.openxmlformats.org/officeDocument/2006/math" xmlns:a14="http://schemas.microsoft.com/office/drawing/2010/main" xmlns:ma14="http://schemas.microsoft.com/office/mac/drawingml/2011/main" val="1"/>
                 </a:ext>
               </a:extLst>
             </p:spPr>
@@ -23003,7 +22923,7 @@
               </a:ln>
               <a:extLst>
                 <a:ext uri="{C572A759-6A51-4108-AA02-DFA0A04FC94B}">
-                  <ma14:wrappingTextBoxFlag xmlns:ma14="http://schemas.microsoft.com/office/mac/drawingml/2011/main" xmlns:a14="http://schemas.microsoft.com/office/drawing/2010/main" xmlns:m="http://schemas.openxmlformats.org/officeDocument/2006/math" xmlns="" val="1"/>
+                  <ma14:wrappingTextBoxFlag xmlns="" xmlns:m="http://schemas.openxmlformats.org/officeDocument/2006/math" xmlns:a14="http://schemas.microsoft.com/office/drawing/2010/main" xmlns:ma14="http://schemas.microsoft.com/office/mac/drawingml/2011/main" val="1"/>
                 </a:ext>
               </a:extLst>
             </p:spPr>
@@ -23085,7 +23005,7 @@
             <a:effectLst/>
             <a:extLst>
               <a:ext uri="{C572A759-6A51-4108-AA02-DFA0A04FC94B}">
-                <ma14:wrappingTextBoxFlag xmlns:ma14="http://schemas.microsoft.com/office/mac/drawingml/2011/main" xmlns:a14="http://schemas.microsoft.com/office/drawing/2010/main" xmlns:m="http://schemas.openxmlformats.org/officeDocument/2006/math" xmlns="" val="1"/>
+                <ma14:wrappingTextBoxFlag xmlns="" xmlns:m="http://schemas.openxmlformats.org/officeDocument/2006/math" xmlns:a14="http://schemas.microsoft.com/office/drawing/2010/main" xmlns:ma14="http://schemas.microsoft.com/office/mac/drawingml/2011/main" val="1"/>
               </a:ext>
             </a:extLst>
           </p:spPr>
@@ -23158,7 +23078,7 @@
             <a:effectLst/>
             <a:extLst>
               <a:ext uri="{C572A759-6A51-4108-AA02-DFA0A04FC94B}">
-                <ma14:wrappingTextBoxFlag xmlns:ma14="http://schemas.microsoft.com/office/mac/drawingml/2011/main" xmlns:a14="http://schemas.microsoft.com/office/drawing/2010/main" xmlns:m="http://schemas.openxmlformats.org/officeDocument/2006/math" xmlns="" val="1"/>
+                <ma14:wrappingTextBoxFlag xmlns="" xmlns:m="http://schemas.openxmlformats.org/officeDocument/2006/math" xmlns:a14="http://schemas.microsoft.com/office/drawing/2010/main" xmlns:ma14="http://schemas.microsoft.com/office/mac/drawingml/2011/main" val="1"/>
               </a:ext>
             </a:extLst>
           </p:spPr>
@@ -23224,7 +23144,7 @@
             </a:ln>
             <a:extLst>
               <a:ext uri="{C572A759-6A51-4108-AA02-DFA0A04FC94B}">
-                <ma14:wrappingTextBoxFlag xmlns:ma14="http://schemas.microsoft.com/office/mac/drawingml/2011/main" xmlns:a14="http://schemas.microsoft.com/office/drawing/2010/main" xmlns:m="http://schemas.openxmlformats.org/officeDocument/2006/math" xmlns="" val="1"/>
+                <ma14:wrappingTextBoxFlag xmlns="" xmlns:m="http://schemas.openxmlformats.org/officeDocument/2006/math" xmlns:a14="http://schemas.microsoft.com/office/drawing/2010/main" xmlns:ma14="http://schemas.microsoft.com/office/mac/drawingml/2011/main" val="1"/>
               </a:ext>
             </a:extLst>
           </p:spPr>
@@ -23282,7 +23202,7 @@
             </a:ln>
             <a:extLst>
               <a:ext uri="{C572A759-6A51-4108-AA02-DFA0A04FC94B}">
-                <ma14:wrappingTextBoxFlag xmlns:ma14="http://schemas.microsoft.com/office/mac/drawingml/2011/main" xmlns:a14="http://schemas.microsoft.com/office/drawing/2010/main" xmlns:m="http://schemas.openxmlformats.org/officeDocument/2006/math" xmlns="" val="1"/>
+                <ma14:wrappingTextBoxFlag xmlns="" xmlns:m="http://schemas.openxmlformats.org/officeDocument/2006/math" xmlns:a14="http://schemas.microsoft.com/office/drawing/2010/main" xmlns:ma14="http://schemas.microsoft.com/office/mac/drawingml/2011/main" val="1"/>
               </a:ext>
             </a:extLst>
           </p:spPr>
@@ -23341,7 +23261,7 @@
           </a:ln>
           <a:extLst>
             <a:ext uri="{C572A759-6A51-4108-AA02-DFA0A04FC94B}">
-              <ma14:wrappingTextBoxFlag xmlns:ma14="http://schemas.microsoft.com/office/mac/drawingml/2011/main" xmlns:a14="http://schemas.microsoft.com/office/drawing/2010/main" xmlns:m="http://schemas.openxmlformats.org/officeDocument/2006/math" xmlns="" val="1"/>
+              <ma14:wrappingTextBoxFlag xmlns="" xmlns:m="http://schemas.openxmlformats.org/officeDocument/2006/math" xmlns:a14="http://schemas.microsoft.com/office/drawing/2010/main" xmlns:ma14="http://schemas.microsoft.com/office/mac/drawingml/2011/main" val="1"/>
             </a:ext>
           </a:extLst>
         </p:spPr>
@@ -23399,7 +23319,7 @@
           </a:ln>
           <a:extLst>
             <a:ext uri="{C572A759-6A51-4108-AA02-DFA0A04FC94B}">
-              <ma14:wrappingTextBoxFlag xmlns:ma14="http://schemas.microsoft.com/office/mac/drawingml/2011/main" xmlns:a14="http://schemas.microsoft.com/office/drawing/2010/main" xmlns:m="http://schemas.openxmlformats.org/officeDocument/2006/math" xmlns="" val="1"/>
+              <ma14:wrappingTextBoxFlag xmlns="" xmlns:m="http://schemas.openxmlformats.org/officeDocument/2006/math" xmlns:a14="http://schemas.microsoft.com/office/drawing/2010/main" xmlns:ma14="http://schemas.microsoft.com/office/mac/drawingml/2011/main" val="1"/>
             </a:ext>
           </a:extLst>
         </p:spPr>
@@ -23643,7 +23563,7 @@
             </a:ln>
             <a:extLst>
               <a:ext uri="{C572A759-6A51-4108-AA02-DFA0A04FC94B}">
-                <ma14:wrappingTextBoxFlag xmlns:ma14="http://schemas.microsoft.com/office/mac/drawingml/2011/main" xmlns:a14="http://schemas.microsoft.com/office/drawing/2010/main" xmlns:m="http://schemas.openxmlformats.org/officeDocument/2006/math" xmlns="" val="1"/>
+                <ma14:wrappingTextBoxFlag xmlns="" xmlns:m="http://schemas.openxmlformats.org/officeDocument/2006/math" xmlns:a14="http://schemas.microsoft.com/office/drawing/2010/main" xmlns:ma14="http://schemas.microsoft.com/office/mac/drawingml/2011/main" val="1"/>
               </a:ext>
             </a:extLst>
           </p:spPr>
@@ -24195,7 +24115,7 @@
             </a:ln>
             <a:extLst>
               <a:ext uri="{C572A759-6A51-4108-AA02-DFA0A04FC94B}">
-                <ma14:wrappingTextBoxFlag xmlns:ma14="http://schemas.microsoft.com/office/mac/drawingml/2011/main" xmlns:a14="http://schemas.microsoft.com/office/drawing/2010/main" xmlns:m="http://schemas.openxmlformats.org/officeDocument/2006/math" xmlns="" val="1"/>
+                <ma14:wrappingTextBoxFlag xmlns="" xmlns:m="http://schemas.openxmlformats.org/officeDocument/2006/math" xmlns:a14="http://schemas.microsoft.com/office/drawing/2010/main" xmlns:ma14="http://schemas.microsoft.com/office/mac/drawingml/2011/main" val="1"/>
               </a:ext>
             </a:extLst>
           </p:spPr>
@@ -24932,7 +24852,7 @@
           </a:prstGeom>
           <a:extLst>
             <a:ext uri="{C572A759-6A51-4108-AA02-DFA0A04FC94B}">
-              <ma14:wrappingTextBoxFlag xmlns:ma14="http://schemas.microsoft.com/office/mac/drawingml/2011/main" xmlns:a14="http://schemas.microsoft.com/office/drawing/2010/main" xmlns:m="http://schemas.openxmlformats.org/officeDocument/2006/math" xmlns="" val="1"/>
+              <ma14:wrappingTextBoxFlag xmlns="" xmlns:m="http://schemas.openxmlformats.org/officeDocument/2006/math" xmlns:a14="http://schemas.microsoft.com/office/drawing/2010/main" xmlns:ma14="http://schemas.microsoft.com/office/mac/drawingml/2011/main" val="1"/>
             </a:ext>
           </a:extLst>
         </p:spPr>
@@ -34233,7 +34153,7 @@
           <a:p>
             <a:r>
               <a:rPr lang="en-US" dirty="0"/>
-              <a:t>Odds and Ends</a:t>
+              <a:t>Odds and Ends You Should Know About</a:t>
             </a:r>
           </a:p>
         </p:txBody>
@@ -35505,7 +35425,7 @@
           </a:ln>
           <a:extLst>
             <a:ext uri="{C572A759-6A51-4108-AA02-DFA0A04FC94B}">
-              <ma14:wrappingTextBoxFlag xmlns:ma14="http://schemas.microsoft.com/office/mac/drawingml/2011/main" xmlns:a14="http://schemas.microsoft.com/office/drawing/2010/main" xmlns:m="http://schemas.openxmlformats.org/officeDocument/2006/math" xmlns="" val="1"/>
+              <ma14:wrappingTextBoxFlag xmlns="" xmlns:m="http://schemas.openxmlformats.org/officeDocument/2006/math" xmlns:a14="http://schemas.microsoft.com/office/drawing/2010/main" xmlns:ma14="http://schemas.microsoft.com/office/mac/drawingml/2011/main" val="1"/>
             </a:ext>
           </a:extLst>
         </p:spPr>
@@ -36463,7 +36383,7 @@
           </a:prstGeom>
           <a:extLst>
             <a:ext uri="{C572A759-6A51-4108-AA02-DFA0A04FC94B}">
-              <ma14:wrappingTextBoxFlag xmlns="" xmlns:m="http://schemas.openxmlformats.org/officeDocument/2006/math" xmlns:a14="http://schemas.microsoft.com/office/drawing/2010/main" xmlns:ma14="http://schemas.microsoft.com/office/mac/drawingml/2011/main" val="1"/>
+              <ma14:wrappingTextBoxFlag xmlns:ma14="http://schemas.microsoft.com/office/mac/drawingml/2011/main" xmlns:a14="http://schemas.microsoft.com/office/drawing/2010/main" xmlns:m="http://schemas.openxmlformats.org/officeDocument/2006/math" xmlns="" val="1"/>
             </a:ext>
           </a:extLst>
         </p:spPr>
@@ -36853,7 +36773,7 @@
               </a:effectLst>
               <a:extLst>
                 <a:ext uri="{C572A759-6A51-4108-AA02-DFA0A04FC94B}">
-                  <ma14:wrappingTextBoxFlag xmlns="" xmlns:m="http://schemas.openxmlformats.org/officeDocument/2006/math" xmlns:a14="http://schemas.microsoft.com/office/drawing/2010/main" xmlns:ma14="http://schemas.microsoft.com/office/mac/drawingml/2011/main" val="1"/>
+                  <ma14:wrappingTextBoxFlag xmlns:ma14="http://schemas.microsoft.com/office/mac/drawingml/2011/main" xmlns:a14="http://schemas.microsoft.com/office/drawing/2010/main" xmlns:m="http://schemas.openxmlformats.org/officeDocument/2006/math" xmlns="" val="1"/>
                 </a:ext>
               </a:extLst>
             </p:spPr>
@@ -36923,7 +36843,7 @@
               </a:effectLst>
               <a:extLst>
                 <a:ext uri="{C572A759-6A51-4108-AA02-DFA0A04FC94B}">
-                  <ma14:wrappingTextBoxFlag xmlns="" xmlns:m="http://schemas.openxmlformats.org/officeDocument/2006/math" xmlns:a14="http://schemas.microsoft.com/office/drawing/2010/main" xmlns:ma14="http://schemas.microsoft.com/office/mac/drawingml/2011/main" val="1"/>
+                  <ma14:wrappingTextBoxFlag xmlns:ma14="http://schemas.microsoft.com/office/mac/drawingml/2011/main" xmlns:a14="http://schemas.microsoft.com/office/drawing/2010/main" xmlns:m="http://schemas.openxmlformats.org/officeDocument/2006/math" xmlns="" val="1"/>
                 </a:ext>
               </a:extLst>
             </p:spPr>
@@ -36991,7 +36911,7 @@
               </a:effectLst>
               <a:extLst>
                 <a:ext uri="{C572A759-6A51-4108-AA02-DFA0A04FC94B}">
-                  <ma14:wrappingTextBoxFlag xmlns="" xmlns:m="http://schemas.openxmlformats.org/officeDocument/2006/math" xmlns:a14="http://schemas.microsoft.com/office/drawing/2010/main" xmlns:ma14="http://schemas.microsoft.com/office/mac/drawingml/2011/main" val="1"/>
+                  <ma14:wrappingTextBoxFlag xmlns:ma14="http://schemas.microsoft.com/office/mac/drawingml/2011/main" xmlns:a14="http://schemas.microsoft.com/office/drawing/2010/main" xmlns:m="http://schemas.openxmlformats.org/officeDocument/2006/math" xmlns="" val="1"/>
                 </a:ext>
               </a:extLst>
             </p:spPr>
@@ -37079,7 +36999,7 @@
                 </a:effectLst>
                 <a:extLst>
                   <a:ext uri="{C572A759-6A51-4108-AA02-DFA0A04FC94B}">
-                    <ma14:wrappingTextBoxFlag xmlns="" xmlns:m="http://schemas.openxmlformats.org/officeDocument/2006/math" xmlns:a14="http://schemas.microsoft.com/office/drawing/2010/main" xmlns:ma14="http://schemas.microsoft.com/office/mac/drawingml/2011/main" val="1"/>
+                    <ma14:wrappingTextBoxFlag xmlns:ma14="http://schemas.microsoft.com/office/mac/drawingml/2011/main" xmlns:a14="http://schemas.microsoft.com/office/drawing/2010/main" xmlns:m="http://schemas.openxmlformats.org/officeDocument/2006/math" xmlns="" val="1"/>
                   </a:ext>
                 </a:extLst>
               </p:spPr>
@@ -37257,7 +37177,7 @@
                   <a:effectLst/>
                   <a:extLst>
                     <a:ext uri="{C572A759-6A51-4108-AA02-DFA0A04FC94B}">
-                      <ma14:wrappingTextBoxFlag xmlns="" xmlns:m="http://schemas.openxmlformats.org/officeDocument/2006/math" xmlns:a14="http://schemas.microsoft.com/office/drawing/2010/main" xmlns:ma14="http://schemas.microsoft.com/office/mac/drawingml/2011/main" val="1"/>
+                      <ma14:wrappingTextBoxFlag xmlns:ma14="http://schemas.microsoft.com/office/mac/drawingml/2011/main" xmlns:a14="http://schemas.microsoft.com/office/drawing/2010/main" xmlns:m="http://schemas.openxmlformats.org/officeDocument/2006/math" xmlns="" val="1"/>
                     </a:ext>
                   </a:extLst>
                 </p:spPr>
@@ -37457,7 +37377,7 @@
                   <a:effectLst/>
                   <a:extLst>
                     <a:ext uri="{C572A759-6A51-4108-AA02-DFA0A04FC94B}">
-                      <ma14:wrappingTextBoxFlag xmlns="" xmlns:m="http://schemas.openxmlformats.org/officeDocument/2006/math" xmlns:a14="http://schemas.microsoft.com/office/drawing/2010/main" xmlns:ma14="http://schemas.microsoft.com/office/mac/drawingml/2011/main" val="1"/>
+                      <ma14:wrappingTextBoxFlag xmlns:ma14="http://schemas.microsoft.com/office/mac/drawingml/2011/main" xmlns:a14="http://schemas.microsoft.com/office/drawing/2010/main" xmlns:m="http://schemas.openxmlformats.org/officeDocument/2006/math" xmlns="" val="1"/>
                     </a:ext>
                   </a:extLst>
                 </p:spPr>
@@ -37547,7 +37467,7 @@
                 </a:effectLst>
                 <a:extLst>
                   <a:ext uri="{C572A759-6A51-4108-AA02-DFA0A04FC94B}">
-                    <ma14:wrappingTextBoxFlag xmlns="" xmlns:m="http://schemas.openxmlformats.org/officeDocument/2006/math" xmlns:a14="http://schemas.microsoft.com/office/drawing/2010/main" xmlns:ma14="http://schemas.microsoft.com/office/mac/drawingml/2011/main" val="1"/>
+                    <ma14:wrappingTextBoxFlag xmlns:ma14="http://schemas.microsoft.com/office/mac/drawingml/2011/main" xmlns:a14="http://schemas.microsoft.com/office/drawing/2010/main" xmlns:m="http://schemas.openxmlformats.org/officeDocument/2006/math" xmlns="" val="1"/>
                   </a:ext>
                 </a:extLst>
               </p:spPr>
@@ -37725,7 +37645,7 @@
                   <a:effectLst/>
                   <a:extLst>
                     <a:ext uri="{C572A759-6A51-4108-AA02-DFA0A04FC94B}">
-                      <ma14:wrappingTextBoxFlag xmlns="" xmlns:m="http://schemas.openxmlformats.org/officeDocument/2006/math" xmlns:a14="http://schemas.microsoft.com/office/drawing/2010/main" xmlns:ma14="http://schemas.microsoft.com/office/mac/drawingml/2011/main" val="1"/>
+                      <ma14:wrappingTextBoxFlag xmlns:ma14="http://schemas.microsoft.com/office/mac/drawingml/2011/main" xmlns:a14="http://schemas.microsoft.com/office/drawing/2010/main" xmlns:m="http://schemas.openxmlformats.org/officeDocument/2006/math" xmlns="" val="1"/>
                     </a:ext>
                   </a:extLst>
                 </p:spPr>
@@ -37815,7 +37735,7 @@
                 </a:effectLst>
                 <a:extLst>
                   <a:ext uri="{C572A759-6A51-4108-AA02-DFA0A04FC94B}">
-                    <ma14:wrappingTextBoxFlag xmlns="" xmlns:m="http://schemas.openxmlformats.org/officeDocument/2006/math" xmlns:a14="http://schemas.microsoft.com/office/drawing/2010/main" xmlns:ma14="http://schemas.microsoft.com/office/mac/drawingml/2011/main" val="1"/>
+                    <ma14:wrappingTextBoxFlag xmlns:ma14="http://schemas.microsoft.com/office/mac/drawingml/2011/main" xmlns:a14="http://schemas.microsoft.com/office/drawing/2010/main" xmlns:m="http://schemas.openxmlformats.org/officeDocument/2006/math" xmlns="" val="1"/>
                   </a:ext>
                 </a:extLst>
               </p:spPr>
@@ -37993,7 +37913,7 @@
                   <a:effectLst/>
                   <a:extLst>
                     <a:ext uri="{C572A759-6A51-4108-AA02-DFA0A04FC94B}">
-                      <ma14:wrappingTextBoxFlag xmlns="" xmlns:m="http://schemas.openxmlformats.org/officeDocument/2006/math" xmlns:a14="http://schemas.microsoft.com/office/drawing/2010/main" xmlns:ma14="http://schemas.microsoft.com/office/mac/drawingml/2011/main" val="1"/>
+                      <ma14:wrappingTextBoxFlag xmlns:ma14="http://schemas.microsoft.com/office/mac/drawingml/2011/main" xmlns:a14="http://schemas.microsoft.com/office/drawing/2010/main" xmlns:m="http://schemas.openxmlformats.org/officeDocument/2006/math" xmlns="" val="1"/>
                     </a:ext>
                   </a:extLst>
                 </p:spPr>
@@ -38064,7 +37984,7 @@
             </a:effectLst>
             <a:extLst>
               <a:ext uri="{C572A759-6A51-4108-AA02-DFA0A04FC94B}">
-                <ma14:wrappingTextBoxFlag xmlns="" xmlns:m="http://schemas.openxmlformats.org/officeDocument/2006/math" xmlns:a14="http://schemas.microsoft.com/office/drawing/2010/main" xmlns:ma14="http://schemas.microsoft.com/office/mac/drawingml/2011/main" val="1"/>
+                <ma14:wrappingTextBoxFlag xmlns:ma14="http://schemas.microsoft.com/office/mac/drawingml/2011/main" xmlns:a14="http://schemas.microsoft.com/office/drawing/2010/main" xmlns:m="http://schemas.openxmlformats.org/officeDocument/2006/math" xmlns="" val="1"/>
               </a:ext>
             </a:extLst>
           </p:spPr>
@@ -38291,7 +38211,7 @@
           </a:prstGeom>
           <a:extLst>
             <a:ext uri="{C572A759-6A51-4108-AA02-DFA0A04FC94B}">
-              <ma14:wrappingTextBoxFlag xmlns="" xmlns:m="http://schemas.openxmlformats.org/officeDocument/2006/math" xmlns:a14="http://schemas.microsoft.com/office/drawing/2010/main" xmlns:ma14="http://schemas.microsoft.com/office/mac/drawingml/2011/main" val="1"/>
+              <ma14:wrappingTextBoxFlag xmlns:ma14="http://schemas.microsoft.com/office/mac/drawingml/2011/main" xmlns:a14="http://schemas.microsoft.com/office/drawing/2010/main" xmlns:m="http://schemas.openxmlformats.org/officeDocument/2006/math" xmlns="" val="1"/>
             </a:ext>
           </a:extLst>
         </p:spPr>
@@ -41740,7 +41660,7 @@
                 <a:effectLst/>
                 <a:latin typeface="Consolas" panose="020B0609020204030204" pitchFamily="49" charset="0"/>
               </a:rPr>
-              <a:t>=&gt;</a:t>
+              <a:t>=&gt; </a:t>
             </a:r>
             <a:r>
               <a:rPr lang="en-US" sz="2400" b="0" dirty="0">
@@ -42337,170 +42257,6 @@
     <p:extLst>
       <p:ext uri="{BB962C8B-B14F-4D97-AF65-F5344CB8AC3E}">
         <p14:creationId xmlns:p14="http://schemas.microsoft.com/office/powerpoint/2010/main" val="2176297323"/>
-      </p:ext>
-    </p:extLst>
-  </p:cSld>
-  <p:clrMapOvr>
-    <a:masterClrMapping/>
-  </p:clrMapOvr>
-</p:sld>
-</file>
-
-<file path=ppt/slides/slide35.xml><?xml version="1.0" encoding="utf-8"?>
-<p:sld xmlns:a="http://schemas.openxmlformats.org/drawingml/2006/main" xmlns:r="http://schemas.openxmlformats.org/officeDocument/2006/relationships" xmlns:p="http://schemas.openxmlformats.org/presentationml/2006/main">
-  <p:cSld>
-    <p:spTree>
-      <p:nvGrpSpPr>
-        <p:cNvPr id="1" name=""/>
-        <p:cNvGrpSpPr/>
-        <p:nvPr/>
-      </p:nvGrpSpPr>
-      <p:grpSpPr>
-        <a:xfrm>
-          <a:off x="0" y="0"/>
-          <a:ext cx="0" cy="0"/>
-          <a:chOff x="0" y="0"/>
-          <a:chExt cx="0" cy="0"/>
-        </a:xfrm>
-      </p:grpSpPr>
-      <p:sp>
-        <p:nvSpPr>
-          <p:cNvPr id="2" name="Title 1">
-            <a:extLst>
-              <a:ext uri="{FF2B5EF4-FFF2-40B4-BE49-F238E27FC236}">
-                <a16:creationId xmlns:a16="http://schemas.microsoft.com/office/drawing/2014/main" id="{E743D407-5B53-49A7-9907-E801EA7FFD8E}"/>
-              </a:ext>
-            </a:extLst>
-          </p:cNvPr>
-          <p:cNvSpPr>
-            <a:spLocks noGrp="1"/>
-          </p:cNvSpPr>
-          <p:nvPr>
-            <p:ph type="title"/>
-          </p:nvPr>
-        </p:nvSpPr>
-        <p:spPr/>
-        <p:txBody>
-          <a:bodyPr/>
-          <a:lstStyle/>
-          <a:p>
-            <a:r>
-              <a:rPr lang="en-US" dirty="0"/>
-              <a:t>Learning Goals for this Lesson (expanded)</a:t>
-            </a:r>
-          </a:p>
-        </p:txBody>
-      </p:sp>
-      <p:sp>
-        <p:nvSpPr>
-          <p:cNvPr id="3" name="Content Placeholder 2">
-            <a:extLst>
-              <a:ext uri="{FF2B5EF4-FFF2-40B4-BE49-F238E27FC236}">
-                <a16:creationId xmlns:a16="http://schemas.microsoft.com/office/drawing/2014/main" id="{AC300E2B-BFD0-4090-AFC5-FE82683F997F}"/>
-              </a:ext>
-            </a:extLst>
-          </p:cNvPr>
-          <p:cNvSpPr>
-            <a:spLocks noGrp="1"/>
-          </p:cNvSpPr>
-          <p:nvPr>
-            <p:ph idx="1"/>
-          </p:nvPr>
-        </p:nvSpPr>
-        <p:spPr>
-          <a:xfrm>
-            <a:off x="838199" y="1500160"/>
-            <a:ext cx="10515599" cy="4351338"/>
-          </a:xfrm>
-        </p:spPr>
-        <p:txBody>
-          <a:bodyPr/>
-          <a:lstStyle/>
-          <a:p>
-            <a:r>
-              <a:rPr lang="en-US" dirty="0"/>
-              <a:t>At the end of this lesson, you should be prepared to:</a:t>
-            </a:r>
-          </a:p>
-          <a:p>
-            <a:pPr lvl="1"/>
-            <a:r>
-              <a:rPr lang="en-US" dirty="0"/>
-              <a:t>Explain how to achieve concurrency through asynchronous operations and </a:t>
-            </a:r>
-            <a:r>
-              <a:rPr lang="en-US" dirty="0" err="1"/>
-              <a:t>Promise.all</a:t>
-            </a:r>
-            <a:r>
-              <a:rPr lang="en-US" dirty="0"/>
-              <a:t> in TypeScript.</a:t>
-            </a:r>
-          </a:p>
-          <a:p>
-            <a:pPr lvl="1"/>
-            <a:r>
-              <a:rPr lang="en-US" dirty="0"/>
-              <a:t>Write asynchronous and concurrent code in TypeScript using async/await and </a:t>
-            </a:r>
-            <a:r>
-              <a:rPr lang="en-US" dirty="0" err="1"/>
-              <a:t>Promise.all</a:t>
-            </a:r>
-            <a:r>
-              <a:rPr lang="en-US" dirty="0"/>
-              <a:t>.</a:t>
-            </a:r>
-          </a:p>
-          <a:p>
-            <a:pPr lvl="1"/>
-            <a:r>
-              <a:rPr lang="en-US" dirty="0"/>
-              <a:t>Write asynchronous code using promises and .then().</a:t>
-            </a:r>
-          </a:p>
-          <a:p>
-            <a:pPr lvl="1"/>
-            <a:r>
-              <a:rPr lang="en-US" dirty="0"/>
-              <a:t>Explain the difference between JS run-to-completion semantics and interrupt-based semantics.</a:t>
-            </a:r>
-          </a:p>
-        </p:txBody>
-      </p:sp>
-      <p:sp>
-        <p:nvSpPr>
-          <p:cNvPr id="4" name="Slide Number Placeholder 3">
-            <a:extLst>
-              <a:ext uri="{FF2B5EF4-FFF2-40B4-BE49-F238E27FC236}">
-                <a16:creationId xmlns:a16="http://schemas.microsoft.com/office/drawing/2014/main" id="{B7BF3F82-6F96-41E0-9C15-23CE00076176}"/>
-              </a:ext>
-            </a:extLst>
-          </p:cNvPr>
-          <p:cNvSpPr>
-            <a:spLocks noGrp="1"/>
-          </p:cNvSpPr>
-          <p:nvPr>
-            <p:ph type="sldNum" sz="quarter" idx="12"/>
-          </p:nvPr>
-        </p:nvSpPr>
-        <p:spPr/>
-        <p:txBody>
-          <a:bodyPr/>
-          <a:lstStyle/>
-          <a:p>
-            <a:fld id="{20F37917-FD3A-4669-9018-DA04BCDD3D75}" type="slidenum">
-              <a:rPr lang="en-US" smtClean="0"/>
-              <a:t>35</a:t>
-            </a:fld>
-            <a:endParaRPr lang="en-US"/>
-          </a:p>
-        </p:txBody>
-      </p:sp>
-    </p:spTree>
-    <p:extLst>
-      <p:ext uri="{BB962C8B-B14F-4D97-AF65-F5344CB8AC3E}">
-        <p14:creationId xmlns:p14="http://schemas.microsoft.com/office/powerpoint/2010/main" val="1338222677"/>
       </p:ext>
     </p:extLst>
   </p:cSld>

</xml_diff>

<commit_message>
fixed typos in M05 slides
</commit_message>
<xml_diff>
--- a/Slides/Module 05 Concurrency Patterns in Typescript.pptx
+++ b/Slides/Module 05 Concurrency Patterns in Typescript.pptx
@@ -351,16 +351,32 @@
 </p:presentation>
 </file>
 
-<file path=ppt/revisionInfo.xml><?xml version="1.0" encoding="utf-8"?>
-<p1510:revInfo xmlns:a="http://schemas.openxmlformats.org/drawingml/2006/main" xmlns:r="http://schemas.openxmlformats.org/officeDocument/2006/relationships" xmlns:p1510="http://schemas.microsoft.com/office/powerpoint/2015/10/main">
-  <p1510:revLst>
-    <p1510:client id="{B8E4A2AB-21F2-4458-9F7A-706A0E6C6B13}" v="46" dt="2022-12-20T16:41:21.569"/>
-  </p1510:revLst>
-</p1510:revInfo>
-</file>
-
 <file path=ppt/changesInfos/changesInfo1.xml><?xml version="1.0" encoding="utf-8"?>
 <pc:chgInfo xmlns:a="http://schemas.openxmlformats.org/drawingml/2006/main" xmlns:r="http://schemas.openxmlformats.org/officeDocument/2006/relationships" xmlns:ac="http://schemas.microsoft.com/office/drawing/2013/main/command" xmlns:pc="http://schemas.microsoft.com/office/powerpoint/2013/main/command">
+  <pc:docChgLst>
+    <pc:chgData name="Mitchell Wand" userId="de9b44c55c049659" providerId="LiveId" clId="{0B90FEE5-5829-4A4E-9080-9D20058FC5A1}"/>
+    <pc:docChg chg="modSld">
+      <pc:chgData name="Mitchell Wand" userId="de9b44c55c049659" providerId="LiveId" clId="{0B90FEE5-5829-4A4E-9080-9D20058FC5A1}" dt="2023-01-26T03:00:22.343" v="4" actId="20577"/>
+      <pc:docMkLst>
+        <pc:docMk/>
+      </pc:docMkLst>
+      <pc:sldChg chg="modSp mod modNotesTx">
+        <pc:chgData name="Mitchell Wand" userId="de9b44c55c049659" providerId="LiveId" clId="{0B90FEE5-5829-4A4E-9080-9D20058FC5A1}" dt="2023-01-26T03:00:22.343" v="4" actId="20577"/>
+        <pc:sldMkLst>
+          <pc:docMk/>
+          <pc:sldMk cId="4097829111" sldId="565"/>
+        </pc:sldMkLst>
+        <pc:spChg chg="mod">
+          <ac:chgData name="Mitchell Wand" userId="de9b44c55c049659" providerId="LiveId" clId="{0B90FEE5-5829-4A4E-9080-9D20058FC5A1}" dt="2023-01-26T03:00:22.343" v="4" actId="20577"/>
+          <ac:spMkLst>
+            <pc:docMk/>
+            <pc:sldMk cId="4097829111" sldId="565"/>
+            <ac:spMk id="17" creationId="{C8DD4A33-B160-11B4-49AC-7EE88C77C8E6}"/>
+          </ac:spMkLst>
+        </pc:spChg>
+      </pc:sldChg>
+    </pc:docChg>
+  </pc:docChgLst>
   <pc:docChgLst>
     <pc:chgData name="Mitchell Wand" userId="de9b44c55c049659" providerId="LiveId" clId="{AC681E7E-7BCE-42F4-8397-34877DEEDE5D}"/>
     <pc:docChg chg="addSld delSld modSld">
@@ -447,60 +463,6 @@
           <pc:docMk/>
           <pc:sldMk cId="2314319587" sldId="556"/>
         </pc:sldMkLst>
-      </pc:sldChg>
-    </pc:docChg>
-  </pc:docChgLst>
-  <pc:docChgLst>
-    <pc:chgData name="Mitchell Wand" userId="de9b44c55c049659" providerId="LiveId" clId="{5F788236-F622-4F92-81A2-AAB773A767CB}"/>
-    <pc:docChg chg="undo custSel addSld modSld">
-      <pc:chgData name="Mitchell Wand" userId="de9b44c55c049659" providerId="LiveId" clId="{5F788236-F622-4F92-81A2-AAB773A767CB}" dt="2022-09-20T18:38:28.835" v="671" actId="20577"/>
-      <pc:docMkLst>
-        <pc:docMk/>
-      </pc:docMkLst>
-      <pc:sldChg chg="modNotesTx">
-        <pc:chgData name="Mitchell Wand" userId="de9b44c55c049659" providerId="LiveId" clId="{5F788236-F622-4F92-81A2-AAB773A767CB}" dt="2022-09-20T17:28:28.152" v="82" actId="20577"/>
-        <pc:sldMkLst>
-          <pc:docMk/>
-          <pc:sldMk cId="0" sldId="262"/>
-        </pc:sldMkLst>
-      </pc:sldChg>
-      <pc:sldChg chg="modNotesTx">
-        <pc:chgData name="Mitchell Wand" userId="de9b44c55c049659" providerId="LiveId" clId="{5F788236-F622-4F92-81A2-AAB773A767CB}" dt="2022-09-20T17:29:13.896" v="184" actId="20577"/>
-        <pc:sldMkLst>
-          <pc:docMk/>
-          <pc:sldMk cId="966027799" sldId="514"/>
-        </pc:sldMkLst>
-      </pc:sldChg>
-      <pc:sldChg chg="addSp modSp new mod modNotesTx">
-        <pc:chgData name="Mitchell Wand" userId="de9b44c55c049659" providerId="LiveId" clId="{5F788236-F622-4F92-81A2-AAB773A767CB}" dt="2022-09-20T18:38:28.835" v="671" actId="20577"/>
-        <pc:sldMkLst>
-          <pc:docMk/>
-          <pc:sldMk cId="3573365039" sldId="557"/>
-        </pc:sldMkLst>
-        <pc:spChg chg="mod">
-          <ac:chgData name="Mitchell Wand" userId="de9b44c55c049659" providerId="LiveId" clId="{5F788236-F622-4F92-81A2-AAB773A767CB}" dt="2022-09-20T18:38:28.835" v="671" actId="20577"/>
-          <ac:spMkLst>
-            <pc:docMk/>
-            <pc:sldMk cId="3573365039" sldId="557"/>
-            <ac:spMk id="2" creationId="{4AB7B9C2-5D09-C319-491E-9E97079CFA3D}"/>
-          </ac:spMkLst>
-        </pc:spChg>
-        <pc:spChg chg="mod">
-          <ac:chgData name="Mitchell Wand" userId="de9b44c55c049659" providerId="LiveId" clId="{5F788236-F622-4F92-81A2-AAB773A767CB}" dt="2022-09-20T18:34:42.701" v="281"/>
-          <ac:spMkLst>
-            <pc:docMk/>
-            <pc:sldMk cId="3573365039" sldId="557"/>
-            <ac:spMk id="3" creationId="{E95A29C5-3A07-008B-EE77-48C8F818925D}"/>
-          </ac:spMkLst>
-        </pc:spChg>
-        <pc:spChg chg="add mod">
-          <ac:chgData name="Mitchell Wand" userId="de9b44c55c049659" providerId="LiveId" clId="{5F788236-F622-4F92-81A2-AAB773A767CB}" dt="2022-09-20T18:36:09.157" v="308" actId="6549"/>
-          <ac:spMkLst>
-            <pc:docMk/>
-            <pc:sldMk cId="3573365039" sldId="557"/>
-            <ac:spMk id="6" creationId="{D7EEA937-36F0-3A62-61A1-D81A0C7A205D}"/>
-          </ac:spMkLst>
-        </pc:spChg>
       </pc:sldChg>
     </pc:docChg>
   </pc:docChgLst>
@@ -1054,6 +1016,60 @@
           <pc:docMk/>
           <pc:sldMk cId="1831664636" sldId="580"/>
         </pc:sldMkLst>
+      </pc:sldChg>
+    </pc:docChg>
+  </pc:docChgLst>
+  <pc:docChgLst>
+    <pc:chgData name="Mitchell Wand" userId="de9b44c55c049659" providerId="LiveId" clId="{5F788236-F622-4F92-81A2-AAB773A767CB}"/>
+    <pc:docChg chg="undo custSel addSld modSld">
+      <pc:chgData name="Mitchell Wand" userId="de9b44c55c049659" providerId="LiveId" clId="{5F788236-F622-4F92-81A2-AAB773A767CB}" dt="2022-09-20T18:38:28.835" v="671" actId="20577"/>
+      <pc:docMkLst>
+        <pc:docMk/>
+      </pc:docMkLst>
+      <pc:sldChg chg="modNotesTx">
+        <pc:chgData name="Mitchell Wand" userId="de9b44c55c049659" providerId="LiveId" clId="{5F788236-F622-4F92-81A2-AAB773A767CB}" dt="2022-09-20T17:28:28.152" v="82" actId="20577"/>
+        <pc:sldMkLst>
+          <pc:docMk/>
+          <pc:sldMk cId="0" sldId="262"/>
+        </pc:sldMkLst>
+      </pc:sldChg>
+      <pc:sldChg chg="modNotesTx">
+        <pc:chgData name="Mitchell Wand" userId="de9b44c55c049659" providerId="LiveId" clId="{5F788236-F622-4F92-81A2-AAB773A767CB}" dt="2022-09-20T17:29:13.896" v="184" actId="20577"/>
+        <pc:sldMkLst>
+          <pc:docMk/>
+          <pc:sldMk cId="966027799" sldId="514"/>
+        </pc:sldMkLst>
+      </pc:sldChg>
+      <pc:sldChg chg="addSp modSp new mod modNotesTx">
+        <pc:chgData name="Mitchell Wand" userId="de9b44c55c049659" providerId="LiveId" clId="{5F788236-F622-4F92-81A2-AAB773A767CB}" dt="2022-09-20T18:38:28.835" v="671" actId="20577"/>
+        <pc:sldMkLst>
+          <pc:docMk/>
+          <pc:sldMk cId="3573365039" sldId="557"/>
+        </pc:sldMkLst>
+        <pc:spChg chg="mod">
+          <ac:chgData name="Mitchell Wand" userId="de9b44c55c049659" providerId="LiveId" clId="{5F788236-F622-4F92-81A2-AAB773A767CB}" dt="2022-09-20T18:38:28.835" v="671" actId="20577"/>
+          <ac:spMkLst>
+            <pc:docMk/>
+            <pc:sldMk cId="3573365039" sldId="557"/>
+            <ac:spMk id="2" creationId="{4AB7B9C2-5D09-C319-491E-9E97079CFA3D}"/>
+          </ac:spMkLst>
+        </pc:spChg>
+        <pc:spChg chg="mod">
+          <ac:chgData name="Mitchell Wand" userId="de9b44c55c049659" providerId="LiveId" clId="{5F788236-F622-4F92-81A2-AAB773A767CB}" dt="2022-09-20T18:34:42.701" v="281"/>
+          <ac:spMkLst>
+            <pc:docMk/>
+            <pc:sldMk cId="3573365039" sldId="557"/>
+            <ac:spMk id="3" creationId="{E95A29C5-3A07-008B-EE77-48C8F818925D}"/>
+          </ac:spMkLst>
+        </pc:spChg>
+        <pc:spChg chg="add mod">
+          <ac:chgData name="Mitchell Wand" userId="de9b44c55c049659" providerId="LiveId" clId="{5F788236-F622-4F92-81A2-AAB773A767CB}" dt="2022-09-20T18:36:09.157" v="308" actId="6549"/>
+          <ac:spMkLst>
+            <pc:docMk/>
+            <pc:sldMk cId="3573365039" sldId="557"/>
+            <ac:spMk id="6" creationId="{D7EEA937-36F0-3A62-61A1-D81A0C7A205D}"/>
+          </ac:spMkLst>
+        </pc:spChg>
       </pc:sldChg>
     </pc:docChg>
   </pc:docChgLst>
@@ -2873,7 +2889,15 @@
           <a:p>
             <a:r>
               <a:rPr lang="en-US" dirty="0"/>
-              <a:t>The starting process (i.., </a:t>
+              <a:t>The starting process (</a:t>
+            </a:r>
+            <a:r>
+              <a:rPr lang="en-US" dirty="0" err="1"/>
+              <a:t>i</a:t>
+            </a:r>
+            <a:r>
+              <a:rPr lang="en-US" dirty="0"/>
+              <a:t>..e, </a:t>
             </a:r>
             <a:r>
               <a:rPr lang="en-US" dirty="0" err="1"/>
@@ -2890,7 +2914,7 @@
           <a:p>
             <a:r>
               <a:rPr lang="en-US" dirty="0"/>
-              <a:t>Transmission is out-of-order:  Request 2 evidently reached the server before Request 1.</a:t>
+              <a:t>Transmission is out-of-order:  Request 3 evidently reached the server before Request 1.</a:t>
             </a:r>
           </a:p>
           <a:p>
@@ -5272,7 +5296,7 @@
                 <a:tabLst/>
                 <a:defRPr/>
               </a:pPr>
-              <a:t>1/24/2023</a:t>
+              <a:t>1/25/2023</a:t>
             </a:fld>
             <a:endParaRPr kumimoji="0" lang="en-US" sz="1200" b="0" i="0" u="none" strike="noStrike" kern="1200" cap="none" spc="0" normalizeH="0" baseline="0" noProof="0">
               <a:ln>
@@ -5756,7 +5780,7 @@
                 <a:tabLst/>
                 <a:defRPr/>
               </a:pPr>
-              <a:t>1/24/2023</a:t>
+              <a:t>1/25/2023</a:t>
             </a:fld>
             <a:endParaRPr kumimoji="0" lang="en-US" sz="1200" b="0" i="0" u="none" strike="noStrike" kern="1200" cap="none" spc="0" normalizeH="0" baseline="0" noProof="0">
               <a:ln>
@@ -6114,7 +6138,7 @@
                 <a:tabLst/>
                 <a:defRPr/>
               </a:pPr>
-              <a:t>1/24/2023</a:t>
+              <a:t>1/25/2023</a:t>
             </a:fld>
             <a:endParaRPr kumimoji="0" lang="en-US" sz="1200" b="0" i="0" u="none" strike="noStrike" kern="1200" cap="none" spc="0" normalizeH="0" baseline="0" noProof="0">
               <a:ln>
@@ -6482,7 +6506,7 @@
                 <a:tabLst/>
                 <a:defRPr/>
               </a:pPr>
-              <a:t>1/24/2023</a:t>
+              <a:t>1/25/2023</a:t>
             </a:fld>
             <a:endParaRPr kumimoji="0" lang="en-US" sz="1200" b="0" i="0" u="none" strike="noStrike" kern="1200" cap="none" spc="0" normalizeH="0" baseline="0" noProof="0">
               <a:ln>
@@ -7448,7 +7472,7 @@
                 <a:tabLst/>
                 <a:defRPr/>
               </a:pPr>
-              <a:t>1/24/2023</a:t>
+              <a:t>1/25/2023</a:t>
             </a:fld>
             <a:endParaRPr kumimoji="0" lang="en-US" sz="1200" b="0" i="0" u="none" strike="noStrike" kern="1200" cap="none" spc="0" normalizeH="0" baseline="0" noProof="0">
               <a:ln>
@@ -7858,7 +7882,7 @@
                 <a:tabLst/>
                 <a:defRPr/>
               </a:pPr>
-              <a:t>1/24/2023</a:t>
+              <a:t>1/25/2023</a:t>
             </a:fld>
             <a:endParaRPr kumimoji="0" lang="en-US" sz="1200" b="0" i="0" u="none" strike="noStrike" kern="1200" cap="none" spc="0" normalizeH="0" baseline="0" noProof="0">
               <a:ln>
@@ -8200,7 +8224,7 @@
                 <a:tabLst/>
                 <a:defRPr/>
               </a:pPr>
-              <a:t>1/24/2023</a:t>
+              <a:t>1/25/2023</a:t>
             </a:fld>
             <a:endParaRPr kumimoji="0" lang="en-US" sz="1200" b="0" i="0" u="none" strike="noStrike" kern="1200" cap="none" spc="0" normalizeH="0" baseline="0" noProof="0">
               <a:ln>
@@ -8673,7 +8697,7 @@
                 <a:tabLst/>
                 <a:defRPr/>
               </a:pPr>
-              <a:t>1/24/2023</a:t>
+              <a:t>1/25/2023</a:t>
             </a:fld>
             <a:endParaRPr kumimoji="0" lang="en-US" sz="1200" b="0" i="0" u="none" strike="noStrike" kern="1200" cap="none" spc="0" normalizeH="0" baseline="0" noProof="0">
               <a:ln>
@@ -9134,7 +9158,7 @@
                 <a:tabLst/>
                 <a:defRPr/>
               </a:pPr>
-              <a:t>1/24/2023</a:t>
+              <a:t>1/25/2023</a:t>
             </a:fld>
             <a:endParaRPr kumimoji="0" lang="en-US" sz="1200" b="0" i="0" u="none" strike="noStrike" kern="1200" cap="none" spc="0" normalizeH="0" baseline="0" noProof="0">
               <a:ln>
@@ -9742,7 +9766,7 @@
                 <a:tabLst/>
                 <a:defRPr/>
               </a:pPr>
-              <a:t>1/24/2023</a:t>
+              <a:t>1/25/2023</a:t>
             </a:fld>
             <a:endParaRPr kumimoji="0" lang="en-US" sz="1200" b="0" i="0" u="none" strike="noStrike" kern="1200" cap="none" spc="0" normalizeH="0" baseline="0" noProof="0">
               <a:ln>
@@ -10015,7 +10039,7 @@
                 <a:tabLst/>
                 <a:defRPr/>
               </a:pPr>
-              <a:t>1/24/2023</a:t>
+              <a:t>1/25/2023</a:t>
             </a:fld>
             <a:endParaRPr kumimoji="0" lang="en-US" sz="1200" b="0" i="0" u="none" strike="noStrike" kern="1200" cap="none" spc="0" normalizeH="0" baseline="0" noProof="0">
               <a:ln>
@@ -10486,7 +10510,7 @@
                 <a:tabLst/>
                 <a:defRPr/>
               </a:pPr>
-              <a:t>1/24/2023</a:t>
+              <a:t>1/25/2023</a:t>
             </a:fld>
             <a:endParaRPr kumimoji="0" lang="en-US" sz="1200" b="0" i="0" u="none" strike="noStrike" kern="1200" cap="none" spc="0" normalizeH="0" baseline="0" noProof="0">
               <a:ln>
@@ -10887,7 +10911,7 @@
                 <a:tabLst/>
                 <a:defRPr/>
               </a:pPr>
-              <a:t>1/24/2023</a:t>
+              <a:t>1/25/2023</a:t>
             </a:fld>
             <a:endParaRPr kumimoji="0" lang="en-US" sz="1200" b="0" i="0" u="none" strike="noStrike" kern="1200" cap="none" spc="0" normalizeH="0" baseline="0" noProof="0">
               <a:ln>
@@ -15266,7 +15290,25 @@
                   </a:solidFill>
                   <a:latin typeface="Ink Free" panose="03080402000500000000" pitchFamily="66" charset="0"/>
                 </a:rPr>
-                <a:t>But the response for request 3 arrived from the server before request 1.</a:t>
+                <a:t>But the response for request 3 </a:t>
+              </a:r>
+              <a:r>
+                <a:rPr lang="en-US" sz="2400" b="1">
+                  <a:solidFill>
+                    <a:schemeClr val="tx1"/>
+                  </a:solidFill>
+                  <a:latin typeface="Ink Free" panose="03080402000500000000" pitchFamily="66" charset="0"/>
+                </a:rPr>
+                <a:t>arrived at </a:t>
+              </a:r>
+              <a:r>
+                <a:rPr lang="en-US" sz="2400" b="1" dirty="0">
+                  <a:solidFill>
+                    <a:schemeClr val="tx1"/>
+                  </a:solidFill>
+                  <a:latin typeface="Ink Free" panose="03080402000500000000" pitchFamily="66" charset="0"/>
+                </a:rPr>
+                <a:t>the server before request 1.</a:t>
               </a:r>
             </a:p>
           </p:txBody>
@@ -20262,7 +20304,7 @@
           </a:ln>
           <a:extLst>
             <a:ext uri="{C572A759-6A51-4108-AA02-DFA0A04FC94B}">
-              <ma14:wrappingTextBoxFlag xmlns="" xmlns:m="http://schemas.openxmlformats.org/officeDocument/2006/math" xmlns:a14="http://schemas.microsoft.com/office/drawing/2010/main" xmlns:ma14="http://schemas.microsoft.com/office/mac/drawingml/2011/main" val="1"/>
+              <ma14:wrappingTextBoxFlag xmlns:ma14="http://schemas.microsoft.com/office/mac/drawingml/2011/main" xmlns:a14="http://schemas.microsoft.com/office/drawing/2010/main" xmlns:m="http://schemas.openxmlformats.org/officeDocument/2006/math" xmlns="" val="1"/>
             </a:ext>
           </a:extLst>
         </p:spPr>
@@ -20851,7 +20893,7 @@
           </a:ln>
           <a:extLst>
             <a:ext uri="{C572A759-6A51-4108-AA02-DFA0A04FC94B}">
-              <ma14:wrappingTextBoxFlag xmlns="" xmlns:m="http://schemas.openxmlformats.org/officeDocument/2006/math" xmlns:a14="http://schemas.microsoft.com/office/drawing/2010/main" xmlns:ma14="http://schemas.microsoft.com/office/mac/drawingml/2011/main" val="1"/>
+              <ma14:wrappingTextBoxFlag xmlns:ma14="http://schemas.microsoft.com/office/mac/drawingml/2011/main" xmlns:a14="http://schemas.microsoft.com/office/drawing/2010/main" xmlns:m="http://schemas.openxmlformats.org/officeDocument/2006/math" xmlns="" val="1"/>
             </a:ext>
           </a:extLst>
         </p:spPr>
@@ -22052,7 +22094,7 @@
             <a:effectLst/>
             <a:extLst>
               <a:ext uri="{C572A759-6A51-4108-AA02-DFA0A04FC94B}">
-                <ma14:wrappingTextBoxFlag xmlns="" xmlns:m="http://schemas.openxmlformats.org/officeDocument/2006/math" xmlns:a14="http://schemas.microsoft.com/office/drawing/2010/main" xmlns:ma14="http://schemas.microsoft.com/office/mac/drawingml/2011/main" val="1"/>
+                <ma14:wrappingTextBoxFlag xmlns:ma14="http://schemas.microsoft.com/office/mac/drawingml/2011/main" xmlns:a14="http://schemas.microsoft.com/office/drawing/2010/main" xmlns:m="http://schemas.openxmlformats.org/officeDocument/2006/math" xmlns="" val="1"/>
               </a:ext>
             </a:extLst>
           </p:spPr>
@@ -22121,7 +22163,7 @@
             <a:effectLst/>
             <a:extLst>
               <a:ext uri="{C572A759-6A51-4108-AA02-DFA0A04FC94B}">
-                <ma14:wrappingTextBoxFlag xmlns="" xmlns:m="http://schemas.openxmlformats.org/officeDocument/2006/math" xmlns:a14="http://schemas.microsoft.com/office/drawing/2010/main" xmlns:ma14="http://schemas.microsoft.com/office/mac/drawingml/2011/main" val="1"/>
+                <ma14:wrappingTextBoxFlag xmlns:ma14="http://schemas.microsoft.com/office/mac/drawingml/2011/main" xmlns:a14="http://schemas.microsoft.com/office/drawing/2010/main" xmlns:m="http://schemas.openxmlformats.org/officeDocument/2006/math" xmlns="" val="1"/>
               </a:ext>
             </a:extLst>
           </p:spPr>
@@ -22187,7 +22229,7 @@
             </a:ln>
             <a:extLst>
               <a:ext uri="{C572A759-6A51-4108-AA02-DFA0A04FC94B}">
-                <ma14:wrappingTextBoxFlag xmlns="" xmlns:m="http://schemas.openxmlformats.org/officeDocument/2006/math" xmlns:a14="http://schemas.microsoft.com/office/drawing/2010/main" xmlns:ma14="http://schemas.microsoft.com/office/mac/drawingml/2011/main" val="1"/>
+                <ma14:wrappingTextBoxFlag xmlns:ma14="http://schemas.microsoft.com/office/mac/drawingml/2011/main" xmlns:a14="http://schemas.microsoft.com/office/drawing/2010/main" xmlns:m="http://schemas.openxmlformats.org/officeDocument/2006/math" xmlns="" val="1"/>
               </a:ext>
             </a:extLst>
           </p:spPr>
@@ -22245,7 +22287,7 @@
             </a:ln>
             <a:extLst>
               <a:ext uri="{C572A759-6A51-4108-AA02-DFA0A04FC94B}">
-                <ma14:wrappingTextBoxFlag xmlns="" xmlns:m="http://schemas.openxmlformats.org/officeDocument/2006/math" xmlns:a14="http://schemas.microsoft.com/office/drawing/2010/main" xmlns:ma14="http://schemas.microsoft.com/office/mac/drawingml/2011/main" val="1"/>
+                <ma14:wrappingTextBoxFlag xmlns:ma14="http://schemas.microsoft.com/office/mac/drawingml/2011/main" xmlns:a14="http://schemas.microsoft.com/office/drawing/2010/main" xmlns:m="http://schemas.openxmlformats.org/officeDocument/2006/math" xmlns="" val="1"/>
               </a:ext>
             </a:extLst>
           </p:spPr>
@@ -22326,7 +22368,7 @@
             <a:effectLst/>
             <a:extLst>
               <a:ext uri="{C572A759-6A51-4108-AA02-DFA0A04FC94B}">
-                <ma14:wrappingTextBoxFlag xmlns="" xmlns:m="http://schemas.openxmlformats.org/officeDocument/2006/math" xmlns:a14="http://schemas.microsoft.com/office/drawing/2010/main" xmlns:ma14="http://schemas.microsoft.com/office/mac/drawingml/2011/main" val="1"/>
+                <ma14:wrappingTextBoxFlag xmlns:ma14="http://schemas.microsoft.com/office/mac/drawingml/2011/main" xmlns:a14="http://schemas.microsoft.com/office/drawing/2010/main" xmlns:m="http://schemas.openxmlformats.org/officeDocument/2006/math" xmlns="" val="1"/>
               </a:ext>
             </a:extLst>
           </p:spPr>
@@ -22399,7 +22441,7 @@
             <a:effectLst/>
             <a:extLst>
               <a:ext uri="{C572A759-6A51-4108-AA02-DFA0A04FC94B}">
-                <ma14:wrappingTextBoxFlag xmlns="" xmlns:m="http://schemas.openxmlformats.org/officeDocument/2006/math" xmlns:a14="http://schemas.microsoft.com/office/drawing/2010/main" xmlns:ma14="http://schemas.microsoft.com/office/mac/drawingml/2011/main" val="1"/>
+                <ma14:wrappingTextBoxFlag xmlns:ma14="http://schemas.microsoft.com/office/mac/drawingml/2011/main" xmlns:a14="http://schemas.microsoft.com/office/drawing/2010/main" xmlns:m="http://schemas.openxmlformats.org/officeDocument/2006/math" xmlns="" val="1"/>
               </a:ext>
             </a:extLst>
           </p:spPr>
@@ -22465,7 +22507,7 @@
             </a:ln>
             <a:extLst>
               <a:ext uri="{C572A759-6A51-4108-AA02-DFA0A04FC94B}">
-                <ma14:wrappingTextBoxFlag xmlns="" xmlns:m="http://schemas.openxmlformats.org/officeDocument/2006/math" xmlns:a14="http://schemas.microsoft.com/office/drawing/2010/main" xmlns:ma14="http://schemas.microsoft.com/office/mac/drawingml/2011/main" val="1"/>
+                <ma14:wrappingTextBoxFlag xmlns:ma14="http://schemas.microsoft.com/office/mac/drawingml/2011/main" xmlns:a14="http://schemas.microsoft.com/office/drawing/2010/main" xmlns:m="http://schemas.openxmlformats.org/officeDocument/2006/math" xmlns="" val="1"/>
               </a:ext>
             </a:extLst>
           </p:spPr>
@@ -22523,7 +22565,7 @@
             </a:ln>
             <a:extLst>
               <a:ext uri="{C572A759-6A51-4108-AA02-DFA0A04FC94B}">
-                <ma14:wrappingTextBoxFlag xmlns="" xmlns:m="http://schemas.openxmlformats.org/officeDocument/2006/math" xmlns:a14="http://schemas.microsoft.com/office/drawing/2010/main" xmlns:ma14="http://schemas.microsoft.com/office/mac/drawingml/2011/main" val="1"/>
+                <ma14:wrappingTextBoxFlag xmlns:ma14="http://schemas.microsoft.com/office/mac/drawingml/2011/main" xmlns:a14="http://schemas.microsoft.com/office/drawing/2010/main" xmlns:m="http://schemas.openxmlformats.org/officeDocument/2006/math" xmlns="" val="1"/>
               </a:ext>
             </a:extLst>
           </p:spPr>
@@ -22604,7 +22646,7 @@
             <a:effectLst/>
             <a:extLst>
               <a:ext uri="{C572A759-6A51-4108-AA02-DFA0A04FC94B}">
-                <ma14:wrappingTextBoxFlag xmlns="" xmlns:m="http://schemas.openxmlformats.org/officeDocument/2006/math" xmlns:a14="http://schemas.microsoft.com/office/drawing/2010/main" xmlns:ma14="http://schemas.microsoft.com/office/mac/drawingml/2011/main" val="1"/>
+                <ma14:wrappingTextBoxFlag xmlns:ma14="http://schemas.microsoft.com/office/mac/drawingml/2011/main" xmlns:a14="http://schemas.microsoft.com/office/drawing/2010/main" xmlns:m="http://schemas.openxmlformats.org/officeDocument/2006/math" xmlns="" val="1"/>
               </a:ext>
             </a:extLst>
           </p:spPr>
@@ -22677,7 +22719,7 @@
             <a:effectLst/>
             <a:extLst>
               <a:ext uri="{C572A759-6A51-4108-AA02-DFA0A04FC94B}">
-                <ma14:wrappingTextBoxFlag xmlns="" xmlns:m="http://schemas.openxmlformats.org/officeDocument/2006/math" xmlns:a14="http://schemas.microsoft.com/office/drawing/2010/main" xmlns:ma14="http://schemas.microsoft.com/office/mac/drawingml/2011/main" val="1"/>
+                <ma14:wrappingTextBoxFlag xmlns:ma14="http://schemas.microsoft.com/office/mac/drawingml/2011/main" xmlns:a14="http://schemas.microsoft.com/office/drawing/2010/main" xmlns:m="http://schemas.openxmlformats.org/officeDocument/2006/math" xmlns="" val="1"/>
               </a:ext>
             </a:extLst>
           </p:spPr>
@@ -22743,7 +22785,7 @@
             </a:ln>
             <a:extLst>
               <a:ext uri="{C572A759-6A51-4108-AA02-DFA0A04FC94B}">
-                <ma14:wrappingTextBoxFlag xmlns="" xmlns:m="http://schemas.openxmlformats.org/officeDocument/2006/math" xmlns:a14="http://schemas.microsoft.com/office/drawing/2010/main" xmlns:ma14="http://schemas.microsoft.com/office/mac/drawingml/2011/main" val="1"/>
+                <ma14:wrappingTextBoxFlag xmlns:ma14="http://schemas.microsoft.com/office/mac/drawingml/2011/main" xmlns:a14="http://schemas.microsoft.com/office/drawing/2010/main" xmlns:m="http://schemas.openxmlformats.org/officeDocument/2006/math" xmlns="" val="1"/>
               </a:ext>
             </a:extLst>
           </p:spPr>
@@ -22801,7 +22843,7 @@
             </a:ln>
             <a:extLst>
               <a:ext uri="{C572A759-6A51-4108-AA02-DFA0A04FC94B}">
-                <ma14:wrappingTextBoxFlag xmlns="" xmlns:m="http://schemas.openxmlformats.org/officeDocument/2006/math" xmlns:a14="http://schemas.microsoft.com/office/drawing/2010/main" xmlns:ma14="http://schemas.microsoft.com/office/mac/drawingml/2011/main" val="1"/>
+                <ma14:wrappingTextBoxFlag xmlns:ma14="http://schemas.microsoft.com/office/mac/drawingml/2011/main" xmlns:a14="http://schemas.microsoft.com/office/drawing/2010/main" xmlns:m="http://schemas.openxmlformats.org/officeDocument/2006/math" xmlns="" val="1"/>
               </a:ext>
             </a:extLst>
           </p:spPr>
@@ -22882,7 +22924,7 @@
             <a:effectLst/>
             <a:extLst>
               <a:ext uri="{C572A759-6A51-4108-AA02-DFA0A04FC94B}">
-                <ma14:wrappingTextBoxFlag xmlns="" xmlns:m="http://schemas.openxmlformats.org/officeDocument/2006/math" xmlns:a14="http://schemas.microsoft.com/office/drawing/2010/main" xmlns:ma14="http://schemas.microsoft.com/office/mac/drawingml/2011/main" val="1"/>
+                <ma14:wrappingTextBoxFlag xmlns:ma14="http://schemas.microsoft.com/office/mac/drawingml/2011/main" xmlns:a14="http://schemas.microsoft.com/office/drawing/2010/main" xmlns:m="http://schemas.openxmlformats.org/officeDocument/2006/math" xmlns="" val="1"/>
               </a:ext>
             </a:extLst>
           </p:spPr>
@@ -22951,7 +22993,7 @@
             <a:effectLst/>
             <a:extLst>
               <a:ext uri="{C572A759-6A51-4108-AA02-DFA0A04FC94B}">
-                <ma14:wrappingTextBoxFlag xmlns="" xmlns:m="http://schemas.openxmlformats.org/officeDocument/2006/math" xmlns:a14="http://schemas.microsoft.com/office/drawing/2010/main" xmlns:ma14="http://schemas.microsoft.com/office/mac/drawingml/2011/main" val="1"/>
+                <ma14:wrappingTextBoxFlag xmlns:ma14="http://schemas.microsoft.com/office/mac/drawingml/2011/main" xmlns:a14="http://schemas.microsoft.com/office/drawing/2010/main" xmlns:m="http://schemas.openxmlformats.org/officeDocument/2006/math" xmlns="" val="1"/>
               </a:ext>
             </a:extLst>
           </p:spPr>
@@ -23017,7 +23059,7 @@
             </a:ln>
             <a:extLst>
               <a:ext uri="{C572A759-6A51-4108-AA02-DFA0A04FC94B}">
-                <ma14:wrappingTextBoxFlag xmlns="" xmlns:m="http://schemas.openxmlformats.org/officeDocument/2006/math" xmlns:a14="http://schemas.microsoft.com/office/drawing/2010/main" xmlns:ma14="http://schemas.microsoft.com/office/mac/drawingml/2011/main" val="1"/>
+                <ma14:wrappingTextBoxFlag xmlns:ma14="http://schemas.microsoft.com/office/mac/drawingml/2011/main" xmlns:a14="http://schemas.microsoft.com/office/drawing/2010/main" xmlns:m="http://schemas.openxmlformats.org/officeDocument/2006/math" xmlns="" val="1"/>
               </a:ext>
             </a:extLst>
           </p:spPr>
@@ -23075,7 +23117,7 @@
             </a:ln>
             <a:extLst>
               <a:ext uri="{C572A759-6A51-4108-AA02-DFA0A04FC94B}">
-                <ma14:wrappingTextBoxFlag xmlns="" xmlns:m="http://schemas.openxmlformats.org/officeDocument/2006/math" xmlns:a14="http://schemas.microsoft.com/office/drawing/2010/main" xmlns:ma14="http://schemas.microsoft.com/office/mac/drawingml/2011/main" val="1"/>
+                <ma14:wrappingTextBoxFlag xmlns:ma14="http://schemas.microsoft.com/office/mac/drawingml/2011/main" xmlns:a14="http://schemas.microsoft.com/office/drawing/2010/main" xmlns:m="http://schemas.openxmlformats.org/officeDocument/2006/math" xmlns="" val="1"/>
               </a:ext>
             </a:extLst>
           </p:spPr>
@@ -23156,7 +23198,7 @@
             <a:effectLst/>
             <a:extLst>
               <a:ext uri="{C572A759-6A51-4108-AA02-DFA0A04FC94B}">
-                <ma14:wrappingTextBoxFlag xmlns="" xmlns:m="http://schemas.openxmlformats.org/officeDocument/2006/math" xmlns:a14="http://schemas.microsoft.com/office/drawing/2010/main" xmlns:ma14="http://schemas.microsoft.com/office/mac/drawingml/2011/main" val="1"/>
+                <ma14:wrappingTextBoxFlag xmlns:ma14="http://schemas.microsoft.com/office/mac/drawingml/2011/main" xmlns:a14="http://schemas.microsoft.com/office/drawing/2010/main" xmlns:m="http://schemas.openxmlformats.org/officeDocument/2006/math" xmlns="" val="1"/>
               </a:ext>
             </a:extLst>
           </p:spPr>
@@ -23249,7 +23291,7 @@
               <a:effectLst/>
               <a:extLst>
                 <a:ext uri="{C572A759-6A51-4108-AA02-DFA0A04FC94B}">
-                  <ma14:wrappingTextBoxFlag xmlns="" xmlns:m="http://schemas.openxmlformats.org/officeDocument/2006/math" xmlns:a14="http://schemas.microsoft.com/office/drawing/2010/main" xmlns:ma14="http://schemas.microsoft.com/office/mac/drawingml/2011/main" val="1"/>
+                  <ma14:wrappingTextBoxFlag xmlns:ma14="http://schemas.microsoft.com/office/mac/drawingml/2011/main" xmlns:a14="http://schemas.microsoft.com/office/drawing/2010/main" xmlns:m="http://schemas.openxmlformats.org/officeDocument/2006/math" xmlns="" val="1"/>
                 </a:ext>
               </a:extLst>
             </p:spPr>
@@ -23315,7 +23357,7 @@
               </a:ln>
               <a:extLst>
                 <a:ext uri="{C572A759-6A51-4108-AA02-DFA0A04FC94B}">
-                  <ma14:wrappingTextBoxFlag xmlns="" xmlns:m="http://schemas.openxmlformats.org/officeDocument/2006/math" xmlns:a14="http://schemas.microsoft.com/office/drawing/2010/main" xmlns:ma14="http://schemas.microsoft.com/office/mac/drawingml/2011/main" val="1"/>
+                  <ma14:wrappingTextBoxFlag xmlns:ma14="http://schemas.microsoft.com/office/mac/drawingml/2011/main" xmlns:a14="http://schemas.microsoft.com/office/drawing/2010/main" xmlns:m="http://schemas.openxmlformats.org/officeDocument/2006/math" xmlns="" val="1"/>
                 </a:ext>
               </a:extLst>
             </p:spPr>
@@ -23373,7 +23415,7 @@
               </a:ln>
               <a:extLst>
                 <a:ext uri="{C572A759-6A51-4108-AA02-DFA0A04FC94B}">
-                  <ma14:wrappingTextBoxFlag xmlns="" xmlns:m="http://schemas.openxmlformats.org/officeDocument/2006/math" xmlns:a14="http://schemas.microsoft.com/office/drawing/2010/main" xmlns:ma14="http://schemas.microsoft.com/office/mac/drawingml/2011/main" val="1"/>
+                  <ma14:wrappingTextBoxFlag xmlns:ma14="http://schemas.microsoft.com/office/mac/drawingml/2011/main" xmlns:a14="http://schemas.microsoft.com/office/drawing/2010/main" xmlns:m="http://schemas.openxmlformats.org/officeDocument/2006/math" xmlns="" val="1"/>
                 </a:ext>
               </a:extLst>
             </p:spPr>
@@ -23455,7 +23497,7 @@
             <a:effectLst/>
             <a:extLst>
               <a:ext uri="{C572A759-6A51-4108-AA02-DFA0A04FC94B}">
-                <ma14:wrappingTextBoxFlag xmlns="" xmlns:m="http://schemas.openxmlformats.org/officeDocument/2006/math" xmlns:a14="http://schemas.microsoft.com/office/drawing/2010/main" xmlns:ma14="http://schemas.microsoft.com/office/mac/drawingml/2011/main" val="1"/>
+                <ma14:wrappingTextBoxFlag xmlns:ma14="http://schemas.microsoft.com/office/mac/drawingml/2011/main" xmlns:a14="http://schemas.microsoft.com/office/drawing/2010/main" xmlns:m="http://schemas.openxmlformats.org/officeDocument/2006/math" xmlns="" val="1"/>
               </a:ext>
             </a:extLst>
           </p:spPr>
@@ -23528,7 +23570,7 @@
             <a:effectLst/>
             <a:extLst>
               <a:ext uri="{C572A759-6A51-4108-AA02-DFA0A04FC94B}">
-                <ma14:wrappingTextBoxFlag xmlns="" xmlns:m="http://schemas.openxmlformats.org/officeDocument/2006/math" xmlns:a14="http://schemas.microsoft.com/office/drawing/2010/main" xmlns:ma14="http://schemas.microsoft.com/office/mac/drawingml/2011/main" val="1"/>
+                <ma14:wrappingTextBoxFlag xmlns:ma14="http://schemas.microsoft.com/office/mac/drawingml/2011/main" xmlns:a14="http://schemas.microsoft.com/office/drawing/2010/main" xmlns:m="http://schemas.openxmlformats.org/officeDocument/2006/math" xmlns="" val="1"/>
               </a:ext>
             </a:extLst>
           </p:spPr>
@@ -23594,7 +23636,7 @@
             </a:ln>
             <a:extLst>
               <a:ext uri="{C572A759-6A51-4108-AA02-DFA0A04FC94B}">
-                <ma14:wrappingTextBoxFlag xmlns="" xmlns:m="http://schemas.openxmlformats.org/officeDocument/2006/math" xmlns:a14="http://schemas.microsoft.com/office/drawing/2010/main" xmlns:ma14="http://schemas.microsoft.com/office/mac/drawingml/2011/main" val="1"/>
+                <ma14:wrappingTextBoxFlag xmlns:ma14="http://schemas.microsoft.com/office/mac/drawingml/2011/main" xmlns:a14="http://schemas.microsoft.com/office/drawing/2010/main" xmlns:m="http://schemas.openxmlformats.org/officeDocument/2006/math" xmlns="" val="1"/>
               </a:ext>
             </a:extLst>
           </p:spPr>
@@ -23652,7 +23694,7 @@
             </a:ln>
             <a:extLst>
               <a:ext uri="{C572A759-6A51-4108-AA02-DFA0A04FC94B}">
-                <ma14:wrappingTextBoxFlag xmlns="" xmlns:m="http://schemas.openxmlformats.org/officeDocument/2006/math" xmlns:a14="http://schemas.microsoft.com/office/drawing/2010/main" xmlns:ma14="http://schemas.microsoft.com/office/mac/drawingml/2011/main" val="1"/>
+                <ma14:wrappingTextBoxFlag xmlns:ma14="http://schemas.microsoft.com/office/mac/drawingml/2011/main" xmlns:a14="http://schemas.microsoft.com/office/drawing/2010/main" xmlns:m="http://schemas.openxmlformats.org/officeDocument/2006/math" xmlns="" val="1"/>
               </a:ext>
             </a:extLst>
           </p:spPr>
@@ -23711,7 +23753,7 @@
           </a:ln>
           <a:extLst>
             <a:ext uri="{C572A759-6A51-4108-AA02-DFA0A04FC94B}">
-              <ma14:wrappingTextBoxFlag xmlns="" xmlns:m="http://schemas.openxmlformats.org/officeDocument/2006/math" xmlns:a14="http://schemas.microsoft.com/office/drawing/2010/main" xmlns:ma14="http://schemas.microsoft.com/office/mac/drawingml/2011/main" val="1"/>
+              <ma14:wrappingTextBoxFlag xmlns:ma14="http://schemas.microsoft.com/office/mac/drawingml/2011/main" xmlns:a14="http://schemas.microsoft.com/office/drawing/2010/main" xmlns:m="http://schemas.openxmlformats.org/officeDocument/2006/math" xmlns="" val="1"/>
             </a:ext>
           </a:extLst>
         </p:spPr>
@@ -23769,7 +23811,7 @@
           </a:ln>
           <a:extLst>
             <a:ext uri="{C572A759-6A51-4108-AA02-DFA0A04FC94B}">
-              <ma14:wrappingTextBoxFlag xmlns="" xmlns:m="http://schemas.openxmlformats.org/officeDocument/2006/math" xmlns:a14="http://schemas.microsoft.com/office/drawing/2010/main" xmlns:ma14="http://schemas.microsoft.com/office/mac/drawingml/2011/main" val="1"/>
+              <ma14:wrappingTextBoxFlag xmlns:ma14="http://schemas.microsoft.com/office/mac/drawingml/2011/main" xmlns:a14="http://schemas.microsoft.com/office/drawing/2010/main" xmlns:m="http://schemas.openxmlformats.org/officeDocument/2006/math" xmlns="" val="1"/>
             </a:ext>
           </a:extLst>
         </p:spPr>
@@ -24013,7 +24055,7 @@
             </a:ln>
             <a:extLst>
               <a:ext uri="{C572A759-6A51-4108-AA02-DFA0A04FC94B}">
-                <ma14:wrappingTextBoxFlag xmlns="" xmlns:m="http://schemas.openxmlformats.org/officeDocument/2006/math" xmlns:a14="http://schemas.microsoft.com/office/drawing/2010/main" xmlns:ma14="http://schemas.microsoft.com/office/mac/drawingml/2011/main" val="1"/>
+                <ma14:wrappingTextBoxFlag xmlns:ma14="http://schemas.microsoft.com/office/mac/drawingml/2011/main" xmlns:a14="http://schemas.microsoft.com/office/drawing/2010/main" xmlns:m="http://schemas.openxmlformats.org/officeDocument/2006/math" xmlns="" val="1"/>
               </a:ext>
             </a:extLst>
           </p:spPr>
@@ -24565,7 +24607,7 @@
             </a:ln>
             <a:extLst>
               <a:ext uri="{C572A759-6A51-4108-AA02-DFA0A04FC94B}">
-                <ma14:wrappingTextBoxFlag xmlns="" xmlns:m="http://schemas.openxmlformats.org/officeDocument/2006/math" xmlns:a14="http://schemas.microsoft.com/office/drawing/2010/main" xmlns:ma14="http://schemas.microsoft.com/office/mac/drawingml/2011/main" val="1"/>
+                <ma14:wrappingTextBoxFlag xmlns:ma14="http://schemas.microsoft.com/office/mac/drawingml/2011/main" xmlns:a14="http://schemas.microsoft.com/office/drawing/2010/main" xmlns:m="http://schemas.openxmlformats.org/officeDocument/2006/math" xmlns="" val="1"/>
               </a:ext>
             </a:extLst>
           </p:spPr>
@@ -25302,7 +25344,7 @@
           </a:prstGeom>
           <a:extLst>
             <a:ext uri="{C572A759-6A51-4108-AA02-DFA0A04FC94B}">
-              <ma14:wrappingTextBoxFlag xmlns="" xmlns:m="http://schemas.openxmlformats.org/officeDocument/2006/math" xmlns:a14="http://schemas.microsoft.com/office/drawing/2010/main" xmlns:ma14="http://schemas.microsoft.com/office/mac/drawingml/2011/main" val="1"/>
+              <ma14:wrappingTextBoxFlag xmlns:ma14="http://schemas.microsoft.com/office/mac/drawingml/2011/main" xmlns:a14="http://schemas.microsoft.com/office/drawing/2010/main" xmlns:m="http://schemas.openxmlformats.org/officeDocument/2006/math" xmlns="" val="1"/>
             </a:ext>
           </a:extLst>
         </p:spPr>
@@ -35847,7 +35889,7 @@
           </a:ln>
           <a:extLst>
             <a:ext uri="{C572A759-6A51-4108-AA02-DFA0A04FC94B}">
-              <ma14:wrappingTextBoxFlag xmlns="" xmlns:m="http://schemas.openxmlformats.org/officeDocument/2006/math" xmlns:a14="http://schemas.microsoft.com/office/drawing/2010/main" xmlns:ma14="http://schemas.microsoft.com/office/mac/drawingml/2011/main" val="1"/>
+              <ma14:wrappingTextBoxFlag xmlns:ma14="http://schemas.microsoft.com/office/mac/drawingml/2011/main" xmlns:a14="http://schemas.microsoft.com/office/drawing/2010/main" xmlns:m="http://schemas.openxmlformats.org/officeDocument/2006/math" xmlns="" val="1"/>
             </a:ext>
           </a:extLst>
         </p:spPr>
@@ -36805,7 +36847,7 @@
           </a:prstGeom>
           <a:extLst>
             <a:ext uri="{C572A759-6A51-4108-AA02-DFA0A04FC94B}">
-              <ma14:wrappingTextBoxFlag xmlns:ma14="http://schemas.microsoft.com/office/mac/drawingml/2011/main" xmlns:a14="http://schemas.microsoft.com/office/drawing/2010/main" xmlns:m="http://schemas.openxmlformats.org/officeDocument/2006/math" xmlns="" val="1"/>
+              <ma14:wrappingTextBoxFlag xmlns="" xmlns:m="http://schemas.openxmlformats.org/officeDocument/2006/math" xmlns:a14="http://schemas.microsoft.com/office/drawing/2010/main" xmlns:ma14="http://schemas.microsoft.com/office/mac/drawingml/2011/main" val="1"/>
             </a:ext>
           </a:extLst>
         </p:spPr>
@@ -37195,7 +37237,7 @@
               </a:effectLst>
               <a:extLst>
                 <a:ext uri="{C572A759-6A51-4108-AA02-DFA0A04FC94B}">
-                  <ma14:wrappingTextBoxFlag xmlns:ma14="http://schemas.microsoft.com/office/mac/drawingml/2011/main" xmlns:a14="http://schemas.microsoft.com/office/drawing/2010/main" xmlns:m="http://schemas.openxmlformats.org/officeDocument/2006/math" xmlns="" val="1"/>
+                  <ma14:wrappingTextBoxFlag xmlns="" xmlns:m="http://schemas.openxmlformats.org/officeDocument/2006/math" xmlns:a14="http://schemas.microsoft.com/office/drawing/2010/main" xmlns:ma14="http://schemas.microsoft.com/office/mac/drawingml/2011/main" val="1"/>
                 </a:ext>
               </a:extLst>
             </p:spPr>
@@ -37265,7 +37307,7 @@
               </a:effectLst>
               <a:extLst>
                 <a:ext uri="{C572A759-6A51-4108-AA02-DFA0A04FC94B}">
-                  <ma14:wrappingTextBoxFlag xmlns:ma14="http://schemas.microsoft.com/office/mac/drawingml/2011/main" xmlns:a14="http://schemas.microsoft.com/office/drawing/2010/main" xmlns:m="http://schemas.openxmlformats.org/officeDocument/2006/math" xmlns="" val="1"/>
+                  <ma14:wrappingTextBoxFlag xmlns="" xmlns:m="http://schemas.openxmlformats.org/officeDocument/2006/math" xmlns:a14="http://schemas.microsoft.com/office/drawing/2010/main" xmlns:ma14="http://schemas.microsoft.com/office/mac/drawingml/2011/main" val="1"/>
                 </a:ext>
               </a:extLst>
             </p:spPr>
@@ -37333,7 +37375,7 @@
               </a:effectLst>
               <a:extLst>
                 <a:ext uri="{C572A759-6A51-4108-AA02-DFA0A04FC94B}">
-                  <ma14:wrappingTextBoxFlag xmlns:ma14="http://schemas.microsoft.com/office/mac/drawingml/2011/main" xmlns:a14="http://schemas.microsoft.com/office/drawing/2010/main" xmlns:m="http://schemas.openxmlformats.org/officeDocument/2006/math" xmlns="" val="1"/>
+                  <ma14:wrappingTextBoxFlag xmlns="" xmlns:m="http://schemas.openxmlformats.org/officeDocument/2006/math" xmlns:a14="http://schemas.microsoft.com/office/drawing/2010/main" xmlns:ma14="http://schemas.microsoft.com/office/mac/drawingml/2011/main" val="1"/>
                 </a:ext>
               </a:extLst>
             </p:spPr>
@@ -37421,7 +37463,7 @@
                 </a:effectLst>
                 <a:extLst>
                   <a:ext uri="{C572A759-6A51-4108-AA02-DFA0A04FC94B}">
-                    <ma14:wrappingTextBoxFlag xmlns:ma14="http://schemas.microsoft.com/office/mac/drawingml/2011/main" xmlns:a14="http://schemas.microsoft.com/office/drawing/2010/main" xmlns:m="http://schemas.openxmlformats.org/officeDocument/2006/math" xmlns="" val="1"/>
+                    <ma14:wrappingTextBoxFlag xmlns="" xmlns:m="http://schemas.openxmlformats.org/officeDocument/2006/math" xmlns:a14="http://schemas.microsoft.com/office/drawing/2010/main" xmlns:ma14="http://schemas.microsoft.com/office/mac/drawingml/2011/main" val="1"/>
                   </a:ext>
                 </a:extLst>
               </p:spPr>
@@ -37599,7 +37641,7 @@
                   <a:effectLst/>
                   <a:extLst>
                     <a:ext uri="{C572A759-6A51-4108-AA02-DFA0A04FC94B}">
-                      <ma14:wrappingTextBoxFlag xmlns:ma14="http://schemas.microsoft.com/office/mac/drawingml/2011/main" xmlns:a14="http://schemas.microsoft.com/office/drawing/2010/main" xmlns:m="http://schemas.openxmlformats.org/officeDocument/2006/math" xmlns="" val="1"/>
+                      <ma14:wrappingTextBoxFlag xmlns="" xmlns:m="http://schemas.openxmlformats.org/officeDocument/2006/math" xmlns:a14="http://schemas.microsoft.com/office/drawing/2010/main" xmlns:ma14="http://schemas.microsoft.com/office/mac/drawingml/2011/main" val="1"/>
                     </a:ext>
                   </a:extLst>
                 </p:spPr>
@@ -37799,7 +37841,7 @@
                   <a:effectLst/>
                   <a:extLst>
                     <a:ext uri="{C572A759-6A51-4108-AA02-DFA0A04FC94B}">
-                      <ma14:wrappingTextBoxFlag xmlns:ma14="http://schemas.microsoft.com/office/mac/drawingml/2011/main" xmlns:a14="http://schemas.microsoft.com/office/drawing/2010/main" xmlns:m="http://schemas.openxmlformats.org/officeDocument/2006/math" xmlns="" val="1"/>
+                      <ma14:wrappingTextBoxFlag xmlns="" xmlns:m="http://schemas.openxmlformats.org/officeDocument/2006/math" xmlns:a14="http://schemas.microsoft.com/office/drawing/2010/main" xmlns:ma14="http://schemas.microsoft.com/office/mac/drawingml/2011/main" val="1"/>
                     </a:ext>
                   </a:extLst>
                 </p:spPr>
@@ -37889,7 +37931,7 @@
                 </a:effectLst>
                 <a:extLst>
                   <a:ext uri="{C572A759-6A51-4108-AA02-DFA0A04FC94B}">
-                    <ma14:wrappingTextBoxFlag xmlns:ma14="http://schemas.microsoft.com/office/mac/drawingml/2011/main" xmlns:a14="http://schemas.microsoft.com/office/drawing/2010/main" xmlns:m="http://schemas.openxmlformats.org/officeDocument/2006/math" xmlns="" val="1"/>
+                    <ma14:wrappingTextBoxFlag xmlns="" xmlns:m="http://schemas.openxmlformats.org/officeDocument/2006/math" xmlns:a14="http://schemas.microsoft.com/office/drawing/2010/main" xmlns:ma14="http://schemas.microsoft.com/office/mac/drawingml/2011/main" val="1"/>
                   </a:ext>
                 </a:extLst>
               </p:spPr>
@@ -38067,7 +38109,7 @@
                   <a:effectLst/>
                   <a:extLst>
                     <a:ext uri="{C572A759-6A51-4108-AA02-DFA0A04FC94B}">
-                      <ma14:wrappingTextBoxFlag xmlns:ma14="http://schemas.microsoft.com/office/mac/drawingml/2011/main" xmlns:a14="http://schemas.microsoft.com/office/drawing/2010/main" xmlns:m="http://schemas.openxmlformats.org/officeDocument/2006/math" xmlns="" val="1"/>
+                      <ma14:wrappingTextBoxFlag xmlns="" xmlns:m="http://schemas.openxmlformats.org/officeDocument/2006/math" xmlns:a14="http://schemas.microsoft.com/office/drawing/2010/main" xmlns:ma14="http://schemas.microsoft.com/office/mac/drawingml/2011/main" val="1"/>
                     </a:ext>
                   </a:extLst>
                 </p:spPr>
@@ -38157,7 +38199,7 @@
                 </a:effectLst>
                 <a:extLst>
                   <a:ext uri="{C572A759-6A51-4108-AA02-DFA0A04FC94B}">
-                    <ma14:wrappingTextBoxFlag xmlns:ma14="http://schemas.microsoft.com/office/mac/drawingml/2011/main" xmlns:a14="http://schemas.microsoft.com/office/drawing/2010/main" xmlns:m="http://schemas.openxmlformats.org/officeDocument/2006/math" xmlns="" val="1"/>
+                    <ma14:wrappingTextBoxFlag xmlns="" xmlns:m="http://schemas.openxmlformats.org/officeDocument/2006/math" xmlns:a14="http://schemas.microsoft.com/office/drawing/2010/main" xmlns:ma14="http://schemas.microsoft.com/office/mac/drawingml/2011/main" val="1"/>
                   </a:ext>
                 </a:extLst>
               </p:spPr>
@@ -38335,7 +38377,7 @@
                   <a:effectLst/>
                   <a:extLst>
                     <a:ext uri="{C572A759-6A51-4108-AA02-DFA0A04FC94B}">
-                      <ma14:wrappingTextBoxFlag xmlns:ma14="http://schemas.microsoft.com/office/mac/drawingml/2011/main" xmlns:a14="http://schemas.microsoft.com/office/drawing/2010/main" xmlns:m="http://schemas.openxmlformats.org/officeDocument/2006/math" xmlns="" val="1"/>
+                      <ma14:wrappingTextBoxFlag xmlns="" xmlns:m="http://schemas.openxmlformats.org/officeDocument/2006/math" xmlns:a14="http://schemas.microsoft.com/office/drawing/2010/main" xmlns:ma14="http://schemas.microsoft.com/office/mac/drawingml/2011/main" val="1"/>
                     </a:ext>
                   </a:extLst>
                 </p:spPr>
@@ -38406,7 +38448,7 @@
             </a:effectLst>
             <a:extLst>
               <a:ext uri="{C572A759-6A51-4108-AA02-DFA0A04FC94B}">
-                <ma14:wrappingTextBoxFlag xmlns:ma14="http://schemas.microsoft.com/office/mac/drawingml/2011/main" xmlns:a14="http://schemas.microsoft.com/office/drawing/2010/main" xmlns:m="http://schemas.openxmlformats.org/officeDocument/2006/math" xmlns="" val="1"/>
+                <ma14:wrappingTextBoxFlag xmlns="" xmlns:m="http://schemas.openxmlformats.org/officeDocument/2006/math" xmlns:a14="http://schemas.microsoft.com/office/drawing/2010/main" xmlns:ma14="http://schemas.microsoft.com/office/mac/drawingml/2011/main" val="1"/>
               </a:ext>
             </a:extLst>
           </p:spPr>
@@ -38633,7 +38675,7 @@
           </a:prstGeom>
           <a:extLst>
             <a:ext uri="{C572A759-6A51-4108-AA02-DFA0A04FC94B}">
-              <ma14:wrappingTextBoxFlag xmlns:ma14="http://schemas.microsoft.com/office/mac/drawingml/2011/main" xmlns:a14="http://schemas.microsoft.com/office/drawing/2010/main" xmlns:m="http://schemas.openxmlformats.org/officeDocument/2006/math" xmlns="" val="1"/>
+              <ma14:wrappingTextBoxFlag xmlns="" xmlns:m="http://schemas.openxmlformats.org/officeDocument/2006/math" xmlns:a14="http://schemas.microsoft.com/office/drawing/2010/main" xmlns:ma14="http://schemas.microsoft.com/office/mac/drawingml/2011/main" val="1"/>
             </a:ext>
           </a:extLst>
         </p:spPr>

</xml_diff>